<commit_message>
Noise generated cells 2D
</commit_message>
<xml_diff>
--- a/6 Results for presentation/Images.pptx
+++ b/6 Results for presentation/Images.pptx
@@ -7,6 +7,8 @@
   <p:sldIdLst>
     <p:sldId id="256" r:id="rId2"/>
     <p:sldId id="257" r:id="rId3"/>
+    <p:sldId id="259" r:id="rId4"/>
+    <p:sldId id="260" r:id="rId5"/>
   </p:sldIdLst>
   <p:sldSz cx="12192000" cy="6858000"/>
   <p:notesSz cx="6858000" cy="9144000"/>
@@ -105,15 +107,735 @@
       </a:defRPr>
     </a:lvl9pPr>
   </p:defaultTextStyle>
+  <p:extLst>
+    <p:ext uri="{EFAFB233-063F-42B5-8137-9DF3F51BA10A}">
+      <p15:sldGuideLst xmlns:p15="http://schemas.microsoft.com/office/powerpoint/2012/main"/>
+    </p:ext>
+  </p:extLst>
 </p:presentation>
 </file>
 
 <file path=ppt/revisionInfo.xml><?xml version="1.0" encoding="utf-8"?>
 <p1510:revInfo xmlns:a="http://schemas.openxmlformats.org/drawingml/2006/main" xmlns:r="http://schemas.openxmlformats.org/officeDocument/2006/relationships" xmlns:p1510="http://schemas.microsoft.com/office/powerpoint/2015/10/main">
   <p1510:revLst>
-    <p1510:client id="{730F1F46-1BAA-904F-9C2E-94E550A23AB9}" v="326" dt="2022-07-13T23:17:29.471"/>
+    <p1510:client id="{730F1F46-1BAA-904F-9C2E-94E550A23AB9}" v="359" dt="2022-07-23T16:03:25.928"/>
   </p1510:revLst>
 </p1510:revInfo>
+</file>
+
+<file path=ppt/changesInfos/changesInfo1.xml><?xml version="1.0" encoding="utf-8"?>
+<pc:chgInfo xmlns:a="http://schemas.openxmlformats.org/drawingml/2006/main" xmlns:r="http://schemas.openxmlformats.org/officeDocument/2006/relationships" xmlns:ac="http://schemas.microsoft.com/office/drawing/2013/main/command" xmlns:pc="http://schemas.microsoft.com/office/powerpoint/2013/main/command">
+  <pc:docChgLst>
+    <pc:chgData name="Sergei Dobrovolskii" userId="73d305bacc4c2cf3" providerId="LiveId" clId="{730F1F46-1BAA-904F-9C2E-94E550A23AB9}"/>
+    <pc:docChg chg="undo custSel addSld delSld modSld">
+      <pc:chgData name="Sergei Dobrovolskii" userId="73d305bacc4c2cf3" providerId="LiveId" clId="{730F1F46-1BAA-904F-9C2E-94E550A23AB9}" dt="2022-07-23T16:03:25.928" v="309"/>
+      <pc:docMkLst>
+        <pc:docMk/>
+      </pc:docMkLst>
+      <pc:sldChg chg="new del">
+        <pc:chgData name="Sergei Dobrovolskii" userId="73d305bacc4c2cf3" providerId="LiveId" clId="{730F1F46-1BAA-904F-9C2E-94E550A23AB9}" dt="2022-07-19T19:12:36.475" v="2" actId="2696"/>
+        <pc:sldMkLst>
+          <pc:docMk/>
+          <pc:sldMk cId="2528890766" sldId="258"/>
+        </pc:sldMkLst>
+      </pc:sldChg>
+      <pc:sldChg chg="addSp delSp modSp add mod">
+        <pc:chgData name="Sergei Dobrovolskii" userId="73d305bacc4c2cf3" providerId="LiveId" clId="{730F1F46-1BAA-904F-9C2E-94E550A23AB9}" dt="2022-07-21T15:48:14.060" v="252" actId="11529"/>
+        <pc:sldMkLst>
+          <pc:docMk/>
+          <pc:sldMk cId="626661408" sldId="259"/>
+        </pc:sldMkLst>
+        <pc:spChg chg="mod">
+          <ac:chgData name="Sergei Dobrovolskii" userId="73d305bacc4c2cf3" providerId="LiveId" clId="{730F1F46-1BAA-904F-9C2E-94E550A23AB9}" dt="2022-07-19T19:15:24.561" v="36" actId="1076"/>
+          <ac:spMkLst>
+            <pc:docMk/>
+            <pc:sldMk cId="626661408" sldId="259"/>
+            <ac:spMk id="2" creationId="{221176F6-16AF-9486-DB55-A52706520B4B}"/>
+          </ac:spMkLst>
+        </pc:spChg>
+        <pc:spChg chg="mod">
+          <ac:chgData name="Sergei Dobrovolskii" userId="73d305bacc4c2cf3" providerId="LiveId" clId="{730F1F46-1BAA-904F-9C2E-94E550A23AB9}" dt="2022-07-19T20:45:32.479" v="180" actId="1076"/>
+          <ac:spMkLst>
+            <pc:docMk/>
+            <pc:sldMk cId="626661408" sldId="259"/>
+            <ac:spMk id="3" creationId="{47A5AD8D-7429-AC1C-4D2D-3ADB5BDC9AE2}"/>
+          </ac:spMkLst>
+        </pc:spChg>
+        <pc:spChg chg="add del mod">
+          <ac:chgData name="Sergei Dobrovolskii" userId="73d305bacc4c2cf3" providerId="LiveId" clId="{730F1F46-1BAA-904F-9C2E-94E550A23AB9}" dt="2022-07-21T15:46:24.837" v="214" actId="478"/>
+          <ac:spMkLst>
+            <pc:docMk/>
+            <pc:sldMk cId="626661408" sldId="259"/>
+            <ac:spMk id="4" creationId="{52CDE14E-6FA0-ECDF-6C86-A37422C31B57}"/>
+          </ac:spMkLst>
+        </pc:spChg>
+        <pc:spChg chg="add mod">
+          <ac:chgData name="Sergei Dobrovolskii" userId="73d305bacc4c2cf3" providerId="LiveId" clId="{730F1F46-1BAA-904F-9C2E-94E550A23AB9}" dt="2022-07-21T15:46:43.758" v="236" actId="20577"/>
+          <ac:spMkLst>
+            <pc:docMk/>
+            <pc:sldMk cId="626661408" sldId="259"/>
+            <ac:spMk id="5" creationId="{829C8D7E-8D42-9B3B-A8B3-ABC5E815EAD3}"/>
+          </ac:spMkLst>
+        </pc:spChg>
+        <pc:spChg chg="mod">
+          <ac:chgData name="Sergei Dobrovolskii" userId="73d305bacc4c2cf3" providerId="LiveId" clId="{730F1F46-1BAA-904F-9C2E-94E550A23AB9}" dt="2022-07-21T15:46:19.848" v="213" actId="1076"/>
+          <ac:spMkLst>
+            <pc:docMk/>
+            <pc:sldMk cId="626661408" sldId="259"/>
+            <ac:spMk id="9" creationId="{AE3B4E4B-ADCC-B86F-4284-E1EB26E1D16F}"/>
+          </ac:spMkLst>
+        </pc:spChg>
+        <pc:spChg chg="del mod">
+          <ac:chgData name="Sergei Dobrovolskii" userId="73d305bacc4c2cf3" providerId="LiveId" clId="{730F1F46-1BAA-904F-9C2E-94E550A23AB9}" dt="2022-07-19T20:48:43.072" v="206" actId="478"/>
+          <ac:spMkLst>
+            <pc:docMk/>
+            <pc:sldMk cId="626661408" sldId="259"/>
+            <ac:spMk id="13" creationId="{DC13FF54-4194-609B-5501-9CC7128F5400}"/>
+          </ac:spMkLst>
+        </pc:spChg>
+        <pc:spChg chg="mod">
+          <ac:chgData name="Sergei Dobrovolskii" userId="73d305bacc4c2cf3" providerId="LiveId" clId="{730F1F46-1BAA-904F-9C2E-94E550A23AB9}" dt="2022-07-21T15:46:19.848" v="213" actId="1076"/>
+          <ac:spMkLst>
+            <pc:docMk/>
+            <pc:sldMk cId="626661408" sldId="259"/>
+            <ac:spMk id="15" creationId="{52589B75-0BA0-EE96-A638-A26909212BEB}"/>
+          </ac:spMkLst>
+        </pc:spChg>
+        <pc:spChg chg="del mod">
+          <ac:chgData name="Sergei Dobrovolskii" userId="73d305bacc4c2cf3" providerId="LiveId" clId="{730F1F46-1BAA-904F-9C2E-94E550A23AB9}" dt="2022-07-19T20:48:43.072" v="206" actId="478"/>
+          <ac:spMkLst>
+            <pc:docMk/>
+            <pc:sldMk cId="626661408" sldId="259"/>
+            <ac:spMk id="16" creationId="{35DC503F-3AD5-27A1-867A-E64CE995887B}"/>
+          </ac:spMkLst>
+        </pc:spChg>
+        <pc:spChg chg="add del mod">
+          <ac:chgData name="Sergei Dobrovolskii" userId="73d305bacc4c2cf3" providerId="LiveId" clId="{730F1F46-1BAA-904F-9C2E-94E550A23AB9}" dt="2022-07-21T15:46:28.155" v="215" actId="478"/>
+          <ac:spMkLst>
+            <pc:docMk/>
+            <pc:sldMk cId="626661408" sldId="259"/>
+            <ac:spMk id="16" creationId="{809D05C3-DC87-8E9B-D3A2-736ABE6F59FA}"/>
+          </ac:spMkLst>
+        </pc:spChg>
+        <pc:spChg chg="add del mod">
+          <ac:chgData name="Sergei Dobrovolskii" userId="73d305bacc4c2cf3" providerId="LiveId" clId="{730F1F46-1BAA-904F-9C2E-94E550A23AB9}" dt="2022-07-21T15:46:28.155" v="215" actId="478"/>
+          <ac:spMkLst>
+            <pc:docMk/>
+            <pc:sldMk cId="626661408" sldId="259"/>
+            <ac:spMk id="18" creationId="{92ACA20C-C104-FC88-B6CA-5162C8CBFCF1}"/>
+          </ac:spMkLst>
+        </pc:spChg>
+        <pc:spChg chg="add mod">
+          <ac:chgData name="Sergei Dobrovolskii" userId="73d305bacc4c2cf3" providerId="LiveId" clId="{730F1F46-1BAA-904F-9C2E-94E550A23AB9}" dt="2022-07-19T19:15:24.561" v="36" actId="1076"/>
+          <ac:spMkLst>
+            <pc:docMk/>
+            <pc:sldMk cId="626661408" sldId="259"/>
+            <ac:spMk id="20" creationId="{AA0B499F-8354-FA7D-0922-E7ED1C2F513B}"/>
+          </ac:spMkLst>
+        </pc:spChg>
+        <pc:spChg chg="add mod">
+          <ac:chgData name="Sergei Dobrovolskii" userId="73d305bacc4c2cf3" providerId="LiveId" clId="{730F1F46-1BAA-904F-9C2E-94E550A23AB9}" dt="2022-07-19T20:46:40.032" v="191" actId="1076"/>
+          <ac:spMkLst>
+            <pc:docMk/>
+            <pc:sldMk cId="626661408" sldId="259"/>
+            <ac:spMk id="23" creationId="{861D50A6-2525-BA55-E28F-F89D21332EB8}"/>
+          </ac:spMkLst>
+        </pc:spChg>
+        <pc:spChg chg="add mod">
+          <ac:chgData name="Sergei Dobrovolskii" userId="73d305bacc4c2cf3" providerId="LiveId" clId="{730F1F46-1BAA-904F-9C2E-94E550A23AB9}" dt="2022-07-19T20:47:02.710" v="195" actId="1076"/>
+          <ac:spMkLst>
+            <pc:docMk/>
+            <pc:sldMk cId="626661408" sldId="259"/>
+            <ac:spMk id="24" creationId="{E55ED254-1B36-4BA7-D956-98785E36A274}"/>
+          </ac:spMkLst>
+        </pc:spChg>
+        <pc:spChg chg="add mod">
+          <ac:chgData name="Sergei Dobrovolskii" userId="73d305bacc4c2cf3" providerId="LiveId" clId="{730F1F46-1BAA-904F-9C2E-94E550A23AB9}" dt="2022-07-19T20:44:31.461" v="167" actId="1076"/>
+          <ac:spMkLst>
+            <pc:docMk/>
+            <pc:sldMk cId="626661408" sldId="259"/>
+            <ac:spMk id="25" creationId="{C272EA99-76E3-5B51-1F25-750CC9A7F76C}"/>
+          </ac:spMkLst>
+        </pc:spChg>
+        <pc:spChg chg="add mod">
+          <ac:chgData name="Sergei Dobrovolskii" userId="73d305bacc4c2cf3" providerId="LiveId" clId="{730F1F46-1BAA-904F-9C2E-94E550A23AB9}" dt="2022-07-19T20:44:31.012" v="166" actId="1076"/>
+          <ac:spMkLst>
+            <pc:docMk/>
+            <pc:sldMk cId="626661408" sldId="259"/>
+            <ac:spMk id="26" creationId="{27E6EAC3-091C-1823-DB1A-6ACC3870BBD9}"/>
+          </ac:spMkLst>
+        </pc:spChg>
+        <pc:spChg chg="add mod">
+          <ac:chgData name="Sergei Dobrovolskii" userId="73d305bacc4c2cf3" providerId="LiveId" clId="{730F1F46-1BAA-904F-9C2E-94E550A23AB9}" dt="2022-07-21T15:46:19.848" v="213" actId="1076"/>
+          <ac:spMkLst>
+            <pc:docMk/>
+            <pc:sldMk cId="626661408" sldId="259"/>
+            <ac:spMk id="28" creationId="{AC201342-3209-ABB1-92EA-F5AF4960CCC4}"/>
+          </ac:spMkLst>
+        </pc:spChg>
+        <pc:spChg chg="del mod">
+          <ac:chgData name="Sergei Dobrovolskii" userId="73d305bacc4c2cf3" providerId="LiveId" clId="{730F1F46-1BAA-904F-9C2E-94E550A23AB9}" dt="2022-07-19T20:48:43.072" v="206" actId="478"/>
+          <ac:spMkLst>
+            <pc:docMk/>
+            <pc:sldMk cId="626661408" sldId="259"/>
+            <ac:spMk id="33" creationId="{A371DA9D-D993-4EBE-DA12-81A34B01CE36}"/>
+          </ac:spMkLst>
+        </pc:spChg>
+        <pc:spChg chg="add mod">
+          <ac:chgData name="Sergei Dobrovolskii" userId="73d305bacc4c2cf3" providerId="LiveId" clId="{730F1F46-1BAA-904F-9C2E-94E550A23AB9}" dt="2022-07-19T20:46:05.243" v="186" actId="1076"/>
+          <ac:spMkLst>
+            <pc:docMk/>
+            <pc:sldMk cId="626661408" sldId="259"/>
+            <ac:spMk id="36" creationId="{C6FB0FBA-27CB-9721-DCD7-EABCC83CD244}"/>
+          </ac:spMkLst>
+        </pc:spChg>
+        <pc:spChg chg="mod">
+          <ac:chgData name="Sergei Dobrovolskii" userId="73d305bacc4c2cf3" providerId="LiveId" clId="{730F1F46-1BAA-904F-9C2E-94E550A23AB9}" dt="2022-07-21T15:46:19.848" v="213" actId="1076"/>
+          <ac:spMkLst>
+            <pc:docMk/>
+            <pc:sldMk cId="626661408" sldId="259"/>
+            <ac:spMk id="37" creationId="{96DC33E0-FF7C-E5C5-4B36-DAD5C737A6EE}"/>
+          </ac:spMkLst>
+        </pc:spChg>
+        <pc:spChg chg="mod">
+          <ac:chgData name="Sergei Dobrovolskii" userId="73d305bacc4c2cf3" providerId="LiveId" clId="{730F1F46-1BAA-904F-9C2E-94E550A23AB9}" dt="2022-07-21T15:46:19.848" v="213" actId="1076"/>
+          <ac:spMkLst>
+            <pc:docMk/>
+            <pc:sldMk cId="626661408" sldId="259"/>
+            <ac:spMk id="38" creationId="{09A95C8B-2595-44B2-9F72-5D295AE95817}"/>
+          </ac:spMkLst>
+        </pc:spChg>
+        <pc:spChg chg="mod">
+          <ac:chgData name="Sergei Dobrovolskii" userId="73d305bacc4c2cf3" providerId="LiveId" clId="{730F1F46-1BAA-904F-9C2E-94E550A23AB9}" dt="2022-07-21T15:46:19.848" v="213" actId="1076"/>
+          <ac:spMkLst>
+            <pc:docMk/>
+            <pc:sldMk cId="626661408" sldId="259"/>
+            <ac:spMk id="39" creationId="{07683283-1ED4-4A32-916B-04FDABF044B3}"/>
+          </ac:spMkLst>
+        </pc:spChg>
+        <pc:spChg chg="add del mod">
+          <ac:chgData name="Sergei Dobrovolskii" userId="73d305bacc4c2cf3" providerId="LiveId" clId="{730F1F46-1BAA-904F-9C2E-94E550A23AB9}" dt="2022-07-21T15:46:28.155" v="215" actId="478"/>
+          <ac:spMkLst>
+            <pc:docMk/>
+            <pc:sldMk cId="626661408" sldId="259"/>
+            <ac:spMk id="42" creationId="{3E4F36DD-39A9-3FAA-621A-C427F859BF4C}"/>
+          </ac:spMkLst>
+        </pc:spChg>
+        <pc:spChg chg="add mod">
+          <ac:chgData name="Sergei Dobrovolskii" userId="73d305bacc4c2cf3" providerId="LiveId" clId="{730F1F46-1BAA-904F-9C2E-94E550A23AB9}" dt="2022-07-21T15:47:56.410" v="250" actId="20577"/>
+          <ac:spMkLst>
+            <pc:docMk/>
+            <pc:sldMk cId="626661408" sldId="259"/>
+            <ac:spMk id="43" creationId="{E360132D-243A-0591-F2D9-D4FA336DE37D}"/>
+          </ac:spMkLst>
+        </pc:spChg>
+        <pc:spChg chg="add mod">
+          <ac:chgData name="Sergei Dobrovolskii" userId="73d305bacc4c2cf3" providerId="LiveId" clId="{730F1F46-1BAA-904F-9C2E-94E550A23AB9}" dt="2022-07-19T20:47:44.500" v="200" actId="20577"/>
+          <ac:spMkLst>
+            <pc:docMk/>
+            <pc:sldMk cId="626661408" sldId="259"/>
+            <ac:spMk id="52" creationId="{40C113AF-D003-8F94-2254-90F45B4FF3E7}"/>
+          </ac:spMkLst>
+        </pc:spChg>
+        <pc:spChg chg="del mod">
+          <ac:chgData name="Sergei Dobrovolskii" userId="73d305bacc4c2cf3" providerId="LiveId" clId="{730F1F46-1BAA-904F-9C2E-94E550A23AB9}" dt="2022-07-19T20:48:43.072" v="206" actId="478"/>
+          <ac:spMkLst>
+            <pc:docMk/>
+            <pc:sldMk cId="626661408" sldId="259"/>
+            <ac:spMk id="58" creationId="{8D6F7962-A0E7-FE8C-BD4C-EEA324578482}"/>
+          </ac:spMkLst>
+        </pc:spChg>
+        <pc:spChg chg="mod">
+          <ac:chgData name="Sergei Dobrovolskii" userId="73d305bacc4c2cf3" providerId="LiveId" clId="{730F1F46-1BAA-904F-9C2E-94E550A23AB9}" dt="2022-07-19T19:15:24.561" v="36" actId="1076"/>
+          <ac:spMkLst>
+            <pc:docMk/>
+            <pc:sldMk cId="626661408" sldId="259"/>
+            <ac:spMk id="61" creationId="{E11F1B59-A6C7-CEAD-95D3-333E9F6AB345}"/>
+          </ac:spMkLst>
+        </pc:spChg>
+        <pc:spChg chg="del mod">
+          <ac:chgData name="Sergei Dobrovolskii" userId="73d305bacc4c2cf3" providerId="LiveId" clId="{730F1F46-1BAA-904F-9C2E-94E550A23AB9}" dt="2022-07-19T20:48:43.072" v="206" actId="478"/>
+          <ac:spMkLst>
+            <pc:docMk/>
+            <pc:sldMk cId="626661408" sldId="259"/>
+            <ac:spMk id="62" creationId="{4C4B2E4E-D2C3-358B-0DCD-6224664FB5A3}"/>
+          </ac:spMkLst>
+        </pc:spChg>
+        <pc:spChg chg="add del">
+          <ac:chgData name="Sergei Dobrovolskii" userId="73d305bacc4c2cf3" providerId="LiveId" clId="{730F1F46-1BAA-904F-9C2E-94E550A23AB9}" dt="2022-07-19T20:45:43.278" v="184" actId="11529"/>
+          <ac:spMkLst>
+            <pc:docMk/>
+            <pc:sldMk cId="626661408" sldId="259"/>
+            <ac:spMk id="1029" creationId="{46405A19-1AA9-CB50-20C0-D8ACA2DE1ED8}"/>
+          </ac:spMkLst>
+        </pc:spChg>
+        <pc:spChg chg="add mod">
+          <ac:chgData name="Sergei Dobrovolskii" userId="73d305bacc4c2cf3" providerId="LiveId" clId="{730F1F46-1BAA-904F-9C2E-94E550A23AB9}" dt="2022-07-19T20:46:36.171" v="190" actId="14100"/>
+          <ac:spMkLst>
+            <pc:docMk/>
+            <pc:sldMk cId="626661408" sldId="259"/>
+            <ac:spMk id="1032" creationId="{36AE498B-CDFE-F29D-9C66-5B66C7D9B5F3}"/>
+          </ac:spMkLst>
+        </pc:spChg>
+        <pc:spChg chg="add mod">
+          <ac:chgData name="Sergei Dobrovolskii" userId="73d305bacc4c2cf3" providerId="LiveId" clId="{730F1F46-1BAA-904F-9C2E-94E550A23AB9}" dt="2022-07-19T20:46:52.263" v="194" actId="14100"/>
+          <ac:spMkLst>
+            <pc:docMk/>
+            <pc:sldMk cId="626661408" sldId="259"/>
+            <ac:spMk id="1033" creationId="{AF8D3A3F-AB79-5541-C34A-80A92A551BA8}"/>
+          </ac:spMkLst>
+        </pc:spChg>
+        <pc:spChg chg="add mod">
+          <ac:chgData name="Sergei Dobrovolskii" userId="73d305bacc4c2cf3" providerId="LiveId" clId="{730F1F46-1BAA-904F-9C2E-94E550A23AB9}" dt="2022-07-19T20:47:12.422" v="198" actId="14100"/>
+          <ac:spMkLst>
+            <pc:docMk/>
+            <pc:sldMk cId="626661408" sldId="259"/>
+            <ac:spMk id="1034" creationId="{1CBD9B7A-9C8B-924A-3B4A-642232437EE1}"/>
+          </ac:spMkLst>
+        </pc:spChg>
+        <pc:spChg chg="del mod">
+          <ac:chgData name="Sergei Dobrovolskii" userId="73d305bacc4c2cf3" providerId="LiveId" clId="{730F1F46-1BAA-904F-9C2E-94E550A23AB9}" dt="2022-07-19T20:48:43.072" v="206" actId="478"/>
+          <ac:spMkLst>
+            <pc:docMk/>
+            <pc:sldMk cId="626661408" sldId="259"/>
+            <ac:spMk id="1035" creationId="{9FB102E4-3301-D93D-B8B0-A5EDFDA0FE58}"/>
+          </ac:spMkLst>
+        </pc:spChg>
+        <pc:spChg chg="mod">
+          <ac:chgData name="Sergei Dobrovolskii" userId="73d305bacc4c2cf3" providerId="LiveId" clId="{730F1F46-1BAA-904F-9C2E-94E550A23AB9}" dt="2022-07-19T20:47:53.681" v="202"/>
+          <ac:spMkLst>
+            <pc:docMk/>
+            <pc:sldMk cId="626661408" sldId="259"/>
+            <ac:spMk id="1039" creationId="{0E93A461-60B4-CDDD-DDC4-5E39FA04AB15}"/>
+          </ac:spMkLst>
+        </pc:spChg>
+        <pc:spChg chg="mod">
+          <ac:chgData name="Sergei Dobrovolskii" userId="73d305bacc4c2cf3" providerId="LiveId" clId="{730F1F46-1BAA-904F-9C2E-94E550A23AB9}" dt="2022-07-19T20:47:53.681" v="202"/>
+          <ac:spMkLst>
+            <pc:docMk/>
+            <pc:sldMk cId="626661408" sldId="259"/>
+            <ac:spMk id="1040" creationId="{147F1939-4E90-02ED-048E-9230C7DB3B41}"/>
+          </ac:spMkLst>
+        </pc:spChg>
+        <pc:spChg chg="mod">
+          <ac:chgData name="Sergei Dobrovolskii" userId="73d305bacc4c2cf3" providerId="LiveId" clId="{730F1F46-1BAA-904F-9C2E-94E550A23AB9}" dt="2022-07-19T20:47:53.681" v="202"/>
+          <ac:spMkLst>
+            <pc:docMk/>
+            <pc:sldMk cId="626661408" sldId="259"/>
+            <ac:spMk id="1041" creationId="{69584DA4-6C2C-8997-1248-5DBA59C0D56B}"/>
+          </ac:spMkLst>
+        </pc:spChg>
+        <pc:spChg chg="add mod">
+          <ac:chgData name="Sergei Dobrovolskii" userId="73d305bacc4c2cf3" providerId="LiveId" clId="{730F1F46-1BAA-904F-9C2E-94E550A23AB9}" dt="2022-07-19T20:49:16.978" v="211" actId="1076"/>
+          <ac:spMkLst>
+            <pc:docMk/>
+            <pc:sldMk cId="626661408" sldId="259"/>
+            <ac:spMk id="1046" creationId="{6A6660FC-9439-49F3-8175-954025B9C4A3}"/>
+          </ac:spMkLst>
+        </pc:spChg>
+        <pc:grpChg chg="add del mod">
+          <ac:chgData name="Sergei Dobrovolskii" userId="73d305bacc4c2cf3" providerId="LiveId" clId="{730F1F46-1BAA-904F-9C2E-94E550A23AB9}" dt="2022-07-21T15:46:28.155" v="215" actId="478"/>
+          <ac:grpSpMkLst>
+            <pc:docMk/>
+            <pc:sldMk cId="626661408" sldId="259"/>
+            <ac:grpSpMk id="6" creationId="{A3213626-92C8-EECF-0E4C-E65936B24E09}"/>
+          </ac:grpSpMkLst>
+        </pc:grpChg>
+        <pc:grpChg chg="add del mod">
+          <ac:chgData name="Sergei Dobrovolskii" userId="73d305bacc4c2cf3" providerId="LiveId" clId="{730F1F46-1BAA-904F-9C2E-94E550A23AB9}" dt="2022-07-21T15:46:28.155" v="215" actId="478"/>
+          <ac:grpSpMkLst>
+            <pc:docMk/>
+            <pc:sldMk cId="626661408" sldId="259"/>
+            <ac:grpSpMk id="12" creationId="{E9ACA0FB-4FA0-BB7A-2222-102D6806ACA7}"/>
+          </ac:grpSpMkLst>
+        </pc:grpChg>
+        <pc:grpChg chg="add mod">
+          <ac:chgData name="Sergei Dobrovolskii" userId="73d305bacc4c2cf3" providerId="LiveId" clId="{730F1F46-1BAA-904F-9C2E-94E550A23AB9}" dt="2022-07-19T19:15:24.561" v="36" actId="1076"/>
+          <ac:grpSpMkLst>
+            <pc:docMk/>
+            <pc:sldMk cId="626661408" sldId="259"/>
+            <ac:grpSpMk id="14" creationId="{3D08DCE3-D0B4-415E-7190-5C4A60F589D1}"/>
+          </ac:grpSpMkLst>
+        </pc:grpChg>
+        <pc:grpChg chg="add mod">
+          <ac:chgData name="Sergei Dobrovolskii" userId="73d305bacc4c2cf3" providerId="LiveId" clId="{730F1F46-1BAA-904F-9C2E-94E550A23AB9}" dt="2022-07-19T19:15:24.561" v="36" actId="1076"/>
+          <ac:grpSpMkLst>
+            <pc:docMk/>
+            <pc:sldMk cId="626661408" sldId="259"/>
+            <ac:grpSpMk id="21" creationId="{A94BF966-1589-26D1-4374-3E8475136D9B}"/>
+          </ac:grpSpMkLst>
+        </pc:grpChg>
+        <pc:grpChg chg="add mod">
+          <ac:chgData name="Sergei Dobrovolskii" userId="73d305bacc4c2cf3" providerId="LiveId" clId="{730F1F46-1BAA-904F-9C2E-94E550A23AB9}" dt="2022-07-21T15:46:19.848" v="213" actId="1076"/>
+          <ac:grpSpMkLst>
+            <pc:docMk/>
+            <pc:sldMk cId="626661408" sldId="259"/>
+            <ac:grpSpMk id="34" creationId="{1C5207FD-6838-AABA-794E-BF1AD08D5EB1}"/>
+          </ac:grpSpMkLst>
+        </pc:grpChg>
+        <pc:grpChg chg="mod">
+          <ac:chgData name="Sergei Dobrovolskii" userId="73d305bacc4c2cf3" providerId="LiveId" clId="{730F1F46-1BAA-904F-9C2E-94E550A23AB9}" dt="2022-07-21T15:46:19.848" v="213" actId="1076"/>
+          <ac:grpSpMkLst>
+            <pc:docMk/>
+            <pc:sldMk cId="626661408" sldId="259"/>
+            <ac:grpSpMk id="35" creationId="{E3D39EC6-9DE0-1DD5-2C7C-2C336E42074C}"/>
+          </ac:grpSpMkLst>
+        </pc:grpChg>
+        <pc:grpChg chg="del mod">
+          <ac:chgData name="Sergei Dobrovolskii" userId="73d305bacc4c2cf3" providerId="LiveId" clId="{730F1F46-1BAA-904F-9C2E-94E550A23AB9}" dt="2022-07-19T20:47:52.707" v="201" actId="21"/>
+          <ac:grpSpMkLst>
+            <pc:docMk/>
+            <pc:sldMk cId="626661408" sldId="259"/>
+            <ac:grpSpMk id="51" creationId="{3B3D6D4C-8C63-65A8-E540-67F6187A45A0}"/>
+          </ac:grpSpMkLst>
+        </pc:grpChg>
+        <pc:grpChg chg="add mod">
+          <ac:chgData name="Sergei Dobrovolskii" userId="73d305bacc4c2cf3" providerId="LiveId" clId="{730F1F46-1BAA-904F-9C2E-94E550A23AB9}" dt="2022-07-19T20:48:02.846" v="203" actId="1076"/>
+          <ac:grpSpMkLst>
+            <pc:docMk/>
+            <pc:sldMk cId="626661408" sldId="259"/>
+            <ac:grpSpMk id="1037" creationId="{22CA382E-CE85-E2F5-599C-0F0614EBCA54}"/>
+          </ac:grpSpMkLst>
+        </pc:grpChg>
+        <pc:grpChg chg="mod">
+          <ac:chgData name="Sergei Dobrovolskii" userId="73d305bacc4c2cf3" providerId="LiveId" clId="{730F1F46-1BAA-904F-9C2E-94E550A23AB9}" dt="2022-07-19T20:47:53.681" v="202"/>
+          <ac:grpSpMkLst>
+            <pc:docMk/>
+            <pc:sldMk cId="626661408" sldId="259"/>
+            <ac:grpSpMk id="1038" creationId="{72893746-135B-AD90-836C-7D5696444D9E}"/>
+          </ac:grpSpMkLst>
+        </pc:grpChg>
+        <pc:picChg chg="add del">
+          <ac:chgData name="Sergei Dobrovolskii" userId="73d305bacc4c2cf3" providerId="LiveId" clId="{730F1F46-1BAA-904F-9C2E-94E550A23AB9}" dt="2022-07-19T19:13:33.647" v="6"/>
+          <ac:picMkLst>
+            <pc:docMk/>
+            <pc:sldMk cId="626661408" sldId="259"/>
+            <ac:picMk id="6" creationId="{A2D17975-C447-6DB8-E663-13734D742F69}"/>
+          </ac:picMkLst>
+        </pc:picChg>
+        <pc:picChg chg="mod">
+          <ac:chgData name="Sergei Dobrovolskii" userId="73d305bacc4c2cf3" providerId="LiveId" clId="{730F1F46-1BAA-904F-9C2E-94E550A23AB9}" dt="2022-07-19T19:15:24.561" v="36" actId="1076"/>
+          <ac:picMkLst>
+            <pc:docMk/>
+            <pc:sldMk cId="626661408" sldId="259"/>
+            <ac:picMk id="7" creationId="{38347B16-09C8-F35B-D665-DBD8AEEB5EB6}"/>
+          </ac:picMkLst>
+        </pc:picChg>
+        <pc:picChg chg="mod">
+          <ac:chgData name="Sergei Dobrovolskii" userId="73d305bacc4c2cf3" providerId="LiveId" clId="{730F1F46-1BAA-904F-9C2E-94E550A23AB9}" dt="2022-07-21T15:46:19.848" v="213" actId="1076"/>
+          <ac:picMkLst>
+            <pc:docMk/>
+            <pc:sldMk cId="626661408" sldId="259"/>
+            <ac:picMk id="8" creationId="{47A0727F-86B0-1319-92D9-E576A9324D86}"/>
+          </ac:picMkLst>
+        </pc:picChg>
+        <pc:picChg chg="mod">
+          <ac:chgData name="Sergei Dobrovolskii" userId="73d305bacc4c2cf3" providerId="LiveId" clId="{730F1F46-1BAA-904F-9C2E-94E550A23AB9}" dt="2022-07-21T15:46:19.848" v="213" actId="1076"/>
+          <ac:picMkLst>
+            <pc:docMk/>
+            <pc:sldMk cId="626661408" sldId="259"/>
+            <ac:picMk id="13" creationId="{51A94C59-F547-88BF-666F-D1B749F162C7}"/>
+          </ac:picMkLst>
+        </pc:picChg>
+        <pc:picChg chg="add del">
+          <ac:chgData name="Sergei Dobrovolskii" userId="73d305bacc4c2cf3" providerId="LiveId" clId="{730F1F46-1BAA-904F-9C2E-94E550A23AB9}" dt="2022-07-21T15:47:43.038" v="240" actId="478"/>
+          <ac:picMkLst>
+            <pc:docMk/>
+            <pc:sldMk cId="626661408" sldId="259"/>
+            <ac:picMk id="44" creationId="{2F7E4993-89E6-8697-A578-D1F392D3C994}"/>
+          </ac:picMkLst>
+        </pc:picChg>
+        <pc:picChg chg="add mod">
+          <ac:chgData name="Sergei Dobrovolskii" userId="73d305bacc4c2cf3" providerId="LiveId" clId="{730F1F46-1BAA-904F-9C2E-94E550A23AB9}" dt="2022-07-19T19:15:24.561" v="36" actId="1076"/>
+          <ac:picMkLst>
+            <pc:docMk/>
+            <pc:sldMk cId="626661408" sldId="259"/>
+            <ac:picMk id="1026" creationId="{5AC1E12A-F38F-8492-50EE-D9B7634F3B82}"/>
+          </ac:picMkLst>
+        </pc:picChg>
+        <pc:cxnChg chg="del mod">
+          <ac:chgData name="Sergei Dobrovolskii" userId="73d305bacc4c2cf3" providerId="LiveId" clId="{730F1F46-1BAA-904F-9C2E-94E550A23AB9}" dt="2022-07-19T19:14:01.908" v="15" actId="478"/>
+          <ac:cxnSpMkLst>
+            <pc:docMk/>
+            <pc:sldMk cId="626661408" sldId="259"/>
+            <ac:cxnSpMk id="9" creationId="{0040E9CC-9D1B-A2CD-0150-367F5280A1E3}"/>
+          </ac:cxnSpMkLst>
+        </pc:cxnChg>
+        <pc:cxnChg chg="add del mod">
+          <ac:chgData name="Sergei Dobrovolskii" userId="73d305bacc4c2cf3" providerId="LiveId" clId="{730F1F46-1BAA-904F-9C2E-94E550A23AB9}" dt="2022-07-21T15:46:28.155" v="215" actId="478"/>
+          <ac:cxnSpMkLst>
+            <pc:docMk/>
+            <pc:sldMk cId="626661408" sldId="259"/>
+            <ac:cxnSpMk id="10" creationId="{0BE9BB2F-7F6D-5715-6E2D-72B18407654C}"/>
+          </ac:cxnSpMkLst>
+        </pc:cxnChg>
+        <pc:cxnChg chg="add del mod">
+          <ac:chgData name="Sergei Dobrovolskii" userId="73d305bacc4c2cf3" providerId="LiveId" clId="{730F1F46-1BAA-904F-9C2E-94E550A23AB9}" dt="2022-07-21T15:46:28.155" v="215" actId="478"/>
+          <ac:cxnSpMkLst>
+            <pc:docMk/>
+            <pc:sldMk cId="626661408" sldId="259"/>
+            <ac:cxnSpMk id="11" creationId="{6610539F-E5B5-1BD8-FD6D-CB714203F96D}"/>
+          </ac:cxnSpMkLst>
+        </pc:cxnChg>
+        <pc:cxnChg chg="add mod">
+          <ac:chgData name="Sergei Dobrovolskii" userId="73d305bacc4c2cf3" providerId="LiveId" clId="{730F1F46-1BAA-904F-9C2E-94E550A23AB9}" dt="2022-07-19T19:15:24.561" v="36" actId="1076"/>
+          <ac:cxnSpMkLst>
+            <pc:docMk/>
+            <pc:sldMk cId="626661408" sldId="259"/>
+            <ac:cxnSpMk id="17" creationId="{9477DD6D-2FD0-719C-49D6-2D9223FC07A9}"/>
+          </ac:cxnSpMkLst>
+        </pc:cxnChg>
+        <pc:cxnChg chg="add mod">
+          <ac:chgData name="Sergei Dobrovolskii" userId="73d305bacc4c2cf3" providerId="LiveId" clId="{730F1F46-1BAA-904F-9C2E-94E550A23AB9}" dt="2022-07-19T19:15:24.561" v="36" actId="1076"/>
+          <ac:cxnSpMkLst>
+            <pc:docMk/>
+            <pc:sldMk cId="626661408" sldId="259"/>
+            <ac:cxnSpMk id="19" creationId="{83B877B3-C21D-005E-D63F-6AC2C1CC74FA}"/>
+          </ac:cxnSpMkLst>
+        </pc:cxnChg>
+        <pc:cxnChg chg="del mod">
+          <ac:chgData name="Sergei Dobrovolskii" userId="73d305bacc4c2cf3" providerId="LiveId" clId="{730F1F46-1BAA-904F-9C2E-94E550A23AB9}" dt="2022-07-19T19:14:02.815" v="16" actId="478"/>
+          <ac:cxnSpMkLst>
+            <pc:docMk/>
+            <pc:sldMk cId="626661408" sldId="259"/>
+            <ac:cxnSpMk id="22" creationId="{3044AA51-888A-1825-D447-0B38EAD40247}"/>
+          </ac:cxnSpMkLst>
+        </pc:cxnChg>
+        <pc:cxnChg chg="add del mod">
+          <ac:chgData name="Sergei Dobrovolskii" userId="73d305bacc4c2cf3" providerId="LiveId" clId="{730F1F46-1BAA-904F-9C2E-94E550A23AB9}" dt="2022-07-21T15:46:28.155" v="215" actId="478"/>
+          <ac:cxnSpMkLst>
+            <pc:docMk/>
+            <pc:sldMk cId="626661408" sldId="259"/>
+            <ac:cxnSpMk id="22" creationId="{A92767CD-3A2C-5A96-4B16-C16F0CEE0D1B}"/>
+          </ac:cxnSpMkLst>
+        </pc:cxnChg>
+        <pc:cxnChg chg="add del mod">
+          <ac:chgData name="Sergei Dobrovolskii" userId="73d305bacc4c2cf3" providerId="LiveId" clId="{730F1F46-1BAA-904F-9C2E-94E550A23AB9}" dt="2022-07-21T15:46:28.155" v="215" actId="478"/>
+          <ac:cxnSpMkLst>
+            <pc:docMk/>
+            <pc:sldMk cId="626661408" sldId="259"/>
+            <ac:cxnSpMk id="27" creationId="{BF9BC5CC-AC39-96DF-7491-B929485CE966}"/>
+          </ac:cxnSpMkLst>
+        </pc:cxnChg>
+        <pc:cxnChg chg="del mod">
+          <ac:chgData name="Sergei Dobrovolskii" userId="73d305bacc4c2cf3" providerId="LiveId" clId="{730F1F46-1BAA-904F-9C2E-94E550A23AB9}" dt="2022-07-19T19:14:03.674" v="17" actId="478"/>
+          <ac:cxnSpMkLst>
+            <pc:docMk/>
+            <pc:sldMk cId="626661408" sldId="259"/>
+            <ac:cxnSpMk id="28" creationId="{96D53A65-AB6C-A208-32D6-3B672DA210C6}"/>
+          </ac:cxnSpMkLst>
+        </pc:cxnChg>
+        <pc:cxnChg chg="add mod">
+          <ac:chgData name="Sergei Dobrovolskii" userId="73d305bacc4c2cf3" providerId="LiveId" clId="{730F1F46-1BAA-904F-9C2E-94E550A23AB9}" dt="2022-07-19T20:44:31.461" v="167" actId="1076"/>
+          <ac:cxnSpMkLst>
+            <pc:docMk/>
+            <pc:sldMk cId="626661408" sldId="259"/>
+            <ac:cxnSpMk id="29" creationId="{03A07199-C093-E711-0C48-DD533167128F}"/>
+          </ac:cxnSpMkLst>
+        </pc:cxnChg>
+        <pc:cxnChg chg="add del mod">
+          <ac:chgData name="Sergei Dobrovolskii" userId="73d305bacc4c2cf3" providerId="LiveId" clId="{730F1F46-1BAA-904F-9C2E-94E550A23AB9}" dt="2022-07-21T15:46:33.262" v="218" actId="478"/>
+          <ac:cxnSpMkLst>
+            <pc:docMk/>
+            <pc:sldMk cId="626661408" sldId="259"/>
+            <ac:cxnSpMk id="30" creationId="{498E9048-32EB-5CFA-1678-913754CF3A77}"/>
+          </ac:cxnSpMkLst>
+        </pc:cxnChg>
+        <pc:cxnChg chg="add mod">
+          <ac:chgData name="Sergei Dobrovolskii" userId="73d305bacc4c2cf3" providerId="LiveId" clId="{730F1F46-1BAA-904F-9C2E-94E550A23AB9}" dt="2022-07-19T20:44:31.012" v="166" actId="1076"/>
+          <ac:cxnSpMkLst>
+            <pc:docMk/>
+            <pc:sldMk cId="626661408" sldId="259"/>
+            <ac:cxnSpMk id="31" creationId="{3C3969C9-7246-997A-E625-6B6DD4E86067}"/>
+          </ac:cxnSpMkLst>
+        </pc:cxnChg>
+        <pc:cxnChg chg="add del mod">
+          <ac:chgData name="Sergei Dobrovolskii" userId="73d305bacc4c2cf3" providerId="LiveId" clId="{730F1F46-1BAA-904F-9C2E-94E550A23AB9}" dt="2022-07-21T15:46:31.391" v="217" actId="478"/>
+          <ac:cxnSpMkLst>
+            <pc:docMk/>
+            <pc:sldMk cId="626661408" sldId="259"/>
+            <ac:cxnSpMk id="32" creationId="{F73770DE-339D-6945-F0FE-E8CCCCEE1628}"/>
+          </ac:cxnSpMkLst>
+        </pc:cxnChg>
+        <pc:cxnChg chg="add del mod">
+          <ac:chgData name="Sergei Dobrovolskii" userId="73d305bacc4c2cf3" providerId="LiveId" clId="{730F1F46-1BAA-904F-9C2E-94E550A23AB9}" dt="2022-07-21T15:46:29.751" v="216" actId="478"/>
+          <ac:cxnSpMkLst>
+            <pc:docMk/>
+            <pc:sldMk cId="626661408" sldId="259"/>
+            <ac:cxnSpMk id="33" creationId="{2BABAA4C-7AA0-2D9C-ABBE-61168648E4D6}"/>
+          </ac:cxnSpMkLst>
+        </pc:cxnChg>
+        <pc:cxnChg chg="add del mod">
+          <ac:chgData name="Sergei Dobrovolskii" userId="73d305bacc4c2cf3" providerId="LiveId" clId="{730F1F46-1BAA-904F-9C2E-94E550A23AB9}" dt="2022-07-19T20:45:37.188" v="182" actId="478"/>
+          <ac:cxnSpMkLst>
+            <pc:docMk/>
+            <pc:sldMk cId="626661408" sldId="259"/>
+            <ac:cxnSpMk id="38" creationId="{CBE1A8F3-A811-81EF-32FA-B5886C161811}"/>
+          </ac:cxnSpMkLst>
+        </pc:cxnChg>
+        <pc:cxnChg chg="del mod">
+          <ac:chgData name="Sergei Dobrovolskii" userId="73d305bacc4c2cf3" providerId="LiveId" clId="{730F1F46-1BAA-904F-9C2E-94E550A23AB9}" dt="2022-07-19T20:48:43.072" v="206" actId="478"/>
+          <ac:cxnSpMkLst>
+            <pc:docMk/>
+            <pc:sldMk cId="626661408" sldId="259"/>
+            <ac:cxnSpMk id="39" creationId="{764B4602-EABD-5F7A-3620-AC5F8B6B4DCF}"/>
+          </ac:cxnSpMkLst>
+        </pc:cxnChg>
+        <pc:cxnChg chg="add mod">
+          <ac:chgData name="Sergei Dobrovolskii" userId="73d305bacc4c2cf3" providerId="LiveId" clId="{730F1F46-1BAA-904F-9C2E-94E550A23AB9}" dt="2022-07-21T15:46:19.848" v="213" actId="1076"/>
+          <ac:cxnSpMkLst>
+            <pc:docMk/>
+            <pc:sldMk cId="626661408" sldId="259"/>
+            <ac:cxnSpMk id="40" creationId="{71400A55-6439-2B03-B9D3-E50562C52136}"/>
+          </ac:cxnSpMkLst>
+        </pc:cxnChg>
+        <pc:cxnChg chg="add mod">
+          <ac:chgData name="Sergei Dobrovolskii" userId="73d305bacc4c2cf3" providerId="LiveId" clId="{730F1F46-1BAA-904F-9C2E-94E550A23AB9}" dt="2022-07-21T15:46:19.848" v="213" actId="1076"/>
+          <ac:cxnSpMkLst>
+            <pc:docMk/>
+            <pc:sldMk cId="626661408" sldId="259"/>
+            <ac:cxnSpMk id="41" creationId="{764DABCF-0F4C-7518-C657-9681515FE83F}"/>
+          </ac:cxnSpMkLst>
+        </pc:cxnChg>
+        <pc:cxnChg chg="del mod">
+          <ac:chgData name="Sergei Dobrovolskii" userId="73d305bacc4c2cf3" providerId="LiveId" clId="{730F1F46-1BAA-904F-9C2E-94E550A23AB9}" dt="2022-07-19T19:56:01.828" v="133" actId="478"/>
+          <ac:cxnSpMkLst>
+            <pc:docMk/>
+            <pc:sldMk cId="626661408" sldId="259"/>
+            <ac:cxnSpMk id="41" creationId="{DDD309BB-7734-E247-A7B1-2B3B93C94575}"/>
+          </ac:cxnSpMkLst>
+        </pc:cxnChg>
+        <pc:cxnChg chg="add">
+          <ac:chgData name="Sergei Dobrovolskii" userId="73d305bacc4c2cf3" providerId="LiveId" clId="{730F1F46-1BAA-904F-9C2E-94E550A23AB9}" dt="2022-07-21T15:48:08.638" v="251" actId="11529"/>
+          <ac:cxnSpMkLst>
+            <pc:docMk/>
+            <pc:sldMk cId="626661408" sldId="259"/>
+            <ac:cxnSpMk id="46" creationId="{3BFC73B5-72A6-39E7-A39C-81651E4D07CB}"/>
+          </ac:cxnSpMkLst>
+        </pc:cxnChg>
+        <pc:cxnChg chg="add">
+          <ac:chgData name="Sergei Dobrovolskii" userId="73d305bacc4c2cf3" providerId="LiveId" clId="{730F1F46-1BAA-904F-9C2E-94E550A23AB9}" dt="2022-07-21T15:48:14.060" v="252" actId="11529"/>
+          <ac:cxnSpMkLst>
+            <pc:docMk/>
+            <pc:sldMk cId="626661408" sldId="259"/>
+            <ac:cxnSpMk id="48" creationId="{7CDA11D5-0E07-1E6A-B3B2-2A62ECF95D33}"/>
+          </ac:cxnSpMkLst>
+        </pc:cxnChg>
+        <pc:cxnChg chg="del mod">
+          <ac:chgData name="Sergei Dobrovolskii" userId="73d305bacc4c2cf3" providerId="LiveId" clId="{730F1F46-1BAA-904F-9C2E-94E550A23AB9}" dt="2022-07-19T20:48:43.072" v="206" actId="478"/>
+          <ac:cxnSpMkLst>
+            <pc:docMk/>
+            <pc:sldMk cId="626661408" sldId="259"/>
+            <ac:cxnSpMk id="53" creationId="{35FF2D9D-7A45-31E9-3BF1-411BA1B75894}"/>
+          </ac:cxnSpMkLst>
+        </pc:cxnChg>
+        <pc:cxnChg chg="add mod">
+          <ac:chgData name="Sergei Dobrovolskii" userId="73d305bacc4c2cf3" providerId="LiveId" clId="{730F1F46-1BAA-904F-9C2E-94E550A23AB9}" dt="2022-07-19T20:45:29.884" v="179" actId="1076"/>
+          <ac:cxnSpMkLst>
+            <pc:docMk/>
+            <pc:sldMk cId="626661408" sldId="259"/>
+            <ac:cxnSpMk id="55" creationId="{36858F9D-1DCD-A1E6-C79D-FAEF49042F64}"/>
+          </ac:cxnSpMkLst>
+        </pc:cxnChg>
+        <pc:cxnChg chg="del mod">
+          <ac:chgData name="Sergei Dobrovolskii" userId="73d305bacc4c2cf3" providerId="LiveId" clId="{730F1F46-1BAA-904F-9C2E-94E550A23AB9}" dt="2022-07-19T20:48:43.072" v="206" actId="478"/>
+          <ac:cxnSpMkLst>
+            <pc:docMk/>
+            <pc:sldMk cId="626661408" sldId="259"/>
+            <ac:cxnSpMk id="56" creationId="{BED27194-02FE-AB47-CD6B-622F13EA36D8}"/>
+          </ac:cxnSpMkLst>
+        </pc:cxnChg>
+        <pc:cxnChg chg="add mod">
+          <ac:chgData name="Sergei Dobrovolskii" userId="73d305bacc4c2cf3" providerId="LiveId" clId="{730F1F46-1BAA-904F-9C2E-94E550A23AB9}" dt="2022-07-19T20:45:29.884" v="179" actId="1076"/>
+          <ac:cxnSpMkLst>
+            <pc:docMk/>
+            <pc:sldMk cId="626661408" sldId="259"/>
+            <ac:cxnSpMk id="59" creationId="{E383FC03-B839-6606-3B1E-AA71EA43A992}"/>
+          </ac:cxnSpMkLst>
+        </pc:cxnChg>
+        <pc:cxnChg chg="del mod">
+          <ac:chgData name="Sergei Dobrovolskii" userId="73d305bacc4c2cf3" providerId="LiveId" clId="{730F1F46-1BAA-904F-9C2E-94E550A23AB9}" dt="2022-07-19T20:48:43.072" v="206" actId="478"/>
+          <ac:cxnSpMkLst>
+            <pc:docMk/>
+            <pc:sldMk cId="626661408" sldId="259"/>
+            <ac:cxnSpMk id="1027" creationId="{1C0C0694-36F9-98ED-AE85-FBF188359A75}"/>
+          </ac:cxnSpMkLst>
+        </pc:cxnChg>
+        <pc:cxnChg chg="add">
+          <ac:chgData name="Sergei Dobrovolskii" userId="73d305bacc4c2cf3" providerId="LiveId" clId="{730F1F46-1BAA-904F-9C2E-94E550A23AB9}" dt="2022-07-19T20:45:50.726" v="185" actId="11529"/>
+          <ac:cxnSpMkLst>
+            <pc:docMk/>
+            <pc:sldMk cId="626661408" sldId="259"/>
+            <ac:cxnSpMk id="1031" creationId="{72DC16F4-40CD-D6DF-AA13-6B5CD3DFBC0F}"/>
+          </ac:cxnSpMkLst>
+        </pc:cxnChg>
+        <pc:cxnChg chg="del mod">
+          <ac:chgData name="Sergei Dobrovolskii" userId="73d305bacc4c2cf3" providerId="LiveId" clId="{730F1F46-1BAA-904F-9C2E-94E550A23AB9}" dt="2022-07-19T20:48:43.072" v="206" actId="478"/>
+          <ac:cxnSpMkLst>
+            <pc:docMk/>
+            <pc:sldMk cId="626661408" sldId="259"/>
+            <ac:cxnSpMk id="1036" creationId="{56C58A41-6F71-5093-981A-3D6BD3168F2C}"/>
+          </ac:cxnSpMkLst>
+        </pc:cxnChg>
+        <pc:cxnChg chg="add">
+          <ac:chgData name="Sergei Dobrovolskii" userId="73d305bacc4c2cf3" providerId="LiveId" clId="{730F1F46-1BAA-904F-9C2E-94E550A23AB9}" dt="2022-07-19T20:48:10.216" v="204" actId="11529"/>
+          <ac:cxnSpMkLst>
+            <pc:docMk/>
+            <pc:sldMk cId="626661408" sldId="259"/>
+            <ac:cxnSpMk id="1043" creationId="{D1C9EA65-C113-2000-9317-2A3E3EA4D6D6}"/>
+          </ac:cxnSpMkLst>
+        </pc:cxnChg>
+        <pc:cxnChg chg="add">
+          <ac:chgData name="Sergei Dobrovolskii" userId="73d305bacc4c2cf3" providerId="LiveId" clId="{730F1F46-1BAA-904F-9C2E-94E550A23AB9}" dt="2022-07-19T20:48:16.168" v="205" actId="11529"/>
+          <ac:cxnSpMkLst>
+            <pc:docMk/>
+            <pc:sldMk cId="626661408" sldId="259"/>
+            <ac:cxnSpMk id="1045" creationId="{47E92391-4404-6A95-D4BC-BD6E796E831E}"/>
+          </ac:cxnSpMkLst>
+        </pc:cxnChg>
+      </pc:sldChg>
+      <pc:sldChg chg="addSp delSp modSp new mod">
+        <pc:chgData name="Sergei Dobrovolskii" userId="73d305bacc4c2cf3" providerId="LiveId" clId="{730F1F46-1BAA-904F-9C2E-94E550A23AB9}" dt="2022-07-23T16:03:25.928" v="309"/>
+        <pc:sldMkLst>
+          <pc:docMk/>
+          <pc:sldMk cId="3031283326" sldId="260"/>
+        </pc:sldMkLst>
+        <pc:spChg chg="add mod">
+          <ac:chgData name="Sergei Dobrovolskii" userId="73d305bacc4c2cf3" providerId="LiveId" clId="{730F1F46-1BAA-904F-9C2E-94E550A23AB9}" dt="2022-07-23T15:54:13.642" v="305" actId="1076"/>
+          <ac:spMkLst>
+            <pc:docMk/>
+            <pc:sldMk cId="3031283326" sldId="260"/>
+            <ac:spMk id="4" creationId="{FC5427E0-7C3E-9DE7-4596-CAB01C18D4B2}"/>
+          </ac:spMkLst>
+        </pc:spChg>
+        <pc:picChg chg="add del mod">
+          <ac:chgData name="Sergei Dobrovolskii" userId="73d305bacc4c2cf3" providerId="LiveId" clId="{730F1F46-1BAA-904F-9C2E-94E550A23AB9}" dt="2022-07-23T15:54:19.288" v="306" actId="478"/>
+          <ac:picMkLst>
+            <pc:docMk/>
+            <pc:sldMk cId="3031283326" sldId="260"/>
+            <ac:picMk id="3" creationId="{A45F6434-9F4E-3E39-5799-657ACB07E462}"/>
+          </ac:picMkLst>
+        </pc:picChg>
+        <pc:picChg chg="add del mod">
+          <ac:chgData name="Sergei Dobrovolskii" userId="73d305bacc4c2cf3" providerId="LiveId" clId="{730F1F46-1BAA-904F-9C2E-94E550A23AB9}" dt="2022-07-23T16:03:22.643" v="308" actId="478"/>
+          <ac:picMkLst>
+            <pc:docMk/>
+            <pc:sldMk cId="3031283326" sldId="260"/>
+            <ac:picMk id="6" creationId="{EB9FF3D1-1BEB-F0DD-9BAB-415E4FF89F90}"/>
+          </ac:picMkLst>
+        </pc:picChg>
+        <pc:picChg chg="add mod">
+          <ac:chgData name="Sergei Dobrovolskii" userId="73d305bacc4c2cf3" providerId="LiveId" clId="{730F1F46-1BAA-904F-9C2E-94E550A23AB9}" dt="2022-07-23T16:03:25.928" v="309"/>
+          <ac:picMkLst>
+            <pc:docMk/>
+            <pc:sldMk cId="3031283326" sldId="260"/>
+            <ac:picMk id="8" creationId="{C8B716F2-F3B3-8AC1-BEB5-AE277CCD9854}"/>
+          </ac:picMkLst>
+        </pc:picChg>
+      </pc:sldChg>
+    </pc:docChg>
+  </pc:docChgLst>
+</pc:chgInfo>
 </file>
 
 <file path=ppt/slideLayouts/slideLayout1.xml><?xml version="1.0" encoding="utf-8"?>
@@ -265,7 +987,7 @@
           <a:p>
             <a:fld id="{1B1BAAE5-7F07-6944-A4FD-3700AC7E5A59}" type="datetimeFigureOut">
               <a:rPr lang="en-DE" smtClean="0"/>
-              <a:t>14.07.22</a:t>
+              <a:t>23.07.22</a:t>
             </a:fld>
             <a:endParaRPr lang="en-DE"/>
           </a:p>
@@ -465,7 +1187,7 @@
           <a:p>
             <a:fld id="{1B1BAAE5-7F07-6944-A4FD-3700AC7E5A59}" type="datetimeFigureOut">
               <a:rPr lang="en-DE" smtClean="0"/>
-              <a:t>14.07.22</a:t>
+              <a:t>23.07.22</a:t>
             </a:fld>
             <a:endParaRPr lang="en-DE"/>
           </a:p>
@@ -675,7 +1397,7 @@
           <a:p>
             <a:fld id="{1B1BAAE5-7F07-6944-A4FD-3700AC7E5A59}" type="datetimeFigureOut">
               <a:rPr lang="en-DE" smtClean="0"/>
-              <a:t>14.07.22</a:t>
+              <a:t>23.07.22</a:t>
             </a:fld>
             <a:endParaRPr lang="en-DE"/>
           </a:p>
@@ -875,7 +1597,7 @@
           <a:p>
             <a:fld id="{1B1BAAE5-7F07-6944-A4FD-3700AC7E5A59}" type="datetimeFigureOut">
               <a:rPr lang="en-DE" smtClean="0"/>
-              <a:t>14.07.22</a:t>
+              <a:t>23.07.22</a:t>
             </a:fld>
             <a:endParaRPr lang="en-DE"/>
           </a:p>
@@ -1151,7 +1873,7 @@
           <a:p>
             <a:fld id="{1B1BAAE5-7F07-6944-A4FD-3700AC7E5A59}" type="datetimeFigureOut">
               <a:rPr lang="en-DE" smtClean="0"/>
-              <a:t>14.07.22</a:t>
+              <a:t>23.07.22</a:t>
             </a:fld>
             <a:endParaRPr lang="en-DE"/>
           </a:p>
@@ -1419,7 +2141,7 @@
           <a:p>
             <a:fld id="{1B1BAAE5-7F07-6944-A4FD-3700AC7E5A59}" type="datetimeFigureOut">
               <a:rPr lang="en-DE" smtClean="0"/>
-              <a:t>14.07.22</a:t>
+              <a:t>23.07.22</a:t>
             </a:fld>
             <a:endParaRPr lang="en-DE"/>
           </a:p>
@@ -1834,7 +2556,7 @@
           <a:p>
             <a:fld id="{1B1BAAE5-7F07-6944-A4FD-3700AC7E5A59}" type="datetimeFigureOut">
               <a:rPr lang="en-DE" smtClean="0"/>
-              <a:t>14.07.22</a:t>
+              <a:t>23.07.22</a:t>
             </a:fld>
             <a:endParaRPr lang="en-DE"/>
           </a:p>
@@ -1976,7 +2698,7 @@
           <a:p>
             <a:fld id="{1B1BAAE5-7F07-6944-A4FD-3700AC7E5A59}" type="datetimeFigureOut">
               <a:rPr lang="en-DE" smtClean="0"/>
-              <a:t>14.07.22</a:t>
+              <a:t>23.07.22</a:t>
             </a:fld>
             <a:endParaRPr lang="en-DE"/>
           </a:p>
@@ -2089,7 +2811,7 @@
           <a:p>
             <a:fld id="{1B1BAAE5-7F07-6944-A4FD-3700AC7E5A59}" type="datetimeFigureOut">
               <a:rPr lang="en-DE" smtClean="0"/>
-              <a:t>14.07.22</a:t>
+              <a:t>23.07.22</a:t>
             </a:fld>
             <a:endParaRPr lang="en-DE"/>
           </a:p>
@@ -2402,7 +3124,7 @@
           <a:p>
             <a:fld id="{1B1BAAE5-7F07-6944-A4FD-3700AC7E5A59}" type="datetimeFigureOut">
               <a:rPr lang="en-DE" smtClean="0"/>
-              <a:t>14.07.22</a:t>
+              <a:t>23.07.22</a:t>
             </a:fld>
             <a:endParaRPr lang="en-DE"/>
           </a:p>
@@ -2691,7 +3413,7 @@
           <a:p>
             <a:fld id="{1B1BAAE5-7F07-6944-A4FD-3700AC7E5A59}" type="datetimeFigureOut">
               <a:rPr lang="en-DE" smtClean="0"/>
-              <a:t>14.07.22</a:t>
+              <a:t>23.07.22</a:t>
             </a:fld>
             <a:endParaRPr lang="en-DE"/>
           </a:p>
@@ -2934,7 +3656,7 @@
           <a:p>
             <a:fld id="{1B1BAAE5-7F07-6944-A4FD-3700AC7E5A59}" type="datetimeFigureOut">
               <a:rPr lang="en-DE" smtClean="0"/>
-              <a:t>14.07.22</a:t>
+              <a:t>23.07.22</a:t>
             </a:fld>
             <a:endParaRPr lang="en-DE"/>
           </a:p>
@@ -4562,6 +5284,1960 @@
 </p:sld>
 </file>
 
+<file path=ppt/slides/slide3.xml><?xml version="1.0" encoding="utf-8"?>
+<p:sld xmlns:a="http://schemas.openxmlformats.org/drawingml/2006/main" xmlns:r="http://schemas.openxmlformats.org/officeDocument/2006/relationships" xmlns:p="http://schemas.openxmlformats.org/presentationml/2006/main">
+  <p:cSld>
+    <p:spTree>
+      <p:nvGrpSpPr>
+        <p:cNvPr id="1" name=""/>
+        <p:cNvGrpSpPr/>
+        <p:nvPr/>
+      </p:nvGrpSpPr>
+      <p:grpSpPr>
+        <a:xfrm>
+          <a:off x="0" y="0"/>
+          <a:ext cx="0" cy="0"/>
+          <a:chOff x="0" y="0"/>
+          <a:chExt cx="0" cy="0"/>
+        </a:xfrm>
+      </p:grpSpPr>
+      <p:sp>
+        <p:nvSpPr>
+          <p:cNvPr id="2" name="Rectangle 1">
+            <a:extLst>
+              <a:ext uri="{FF2B5EF4-FFF2-40B4-BE49-F238E27FC236}">
+                <a16:creationId xmlns:a16="http://schemas.microsoft.com/office/drawing/2014/main" id="{221176F6-16AF-9486-DB55-A52706520B4B}"/>
+              </a:ext>
+            </a:extLst>
+          </p:cNvPr>
+          <p:cNvSpPr>
+            <a:spLocks noChangeAspect="1"/>
+          </p:cNvSpPr>
+          <p:nvPr/>
+        </p:nvSpPr>
+        <p:spPr>
+          <a:xfrm>
+            <a:off x="2797237" y="374153"/>
+            <a:ext cx="1021278" cy="1021278"/>
+          </a:xfrm>
+          <a:prstGeom prst="rect">
+            <a:avLst/>
+          </a:prstGeom>
+          <a:blipFill dpi="0" rotWithShape="1">
+            <a:blip r:embed="rId2">
+              <a:extLst>
+                <a:ext uri="{28A0092B-C50C-407E-A947-70E740481C1C}">
+                  <a14:useLocalDpi xmlns:a14="http://schemas.microsoft.com/office/drawing/2010/main" val="0"/>
+                </a:ext>
+              </a:extLst>
+            </a:blip>
+            <a:srcRect/>
+            <a:stretch>
+              <a:fillRect/>
+            </a:stretch>
+          </a:blipFill>
+        </p:spPr>
+        <p:style>
+          <a:lnRef idx="2">
+            <a:schemeClr val="accent1">
+              <a:shade val="50000"/>
+            </a:schemeClr>
+          </a:lnRef>
+          <a:fillRef idx="1">
+            <a:schemeClr val="accent1"/>
+          </a:fillRef>
+          <a:effectRef idx="0">
+            <a:schemeClr val="accent1"/>
+          </a:effectRef>
+          <a:fontRef idx="minor">
+            <a:schemeClr val="lt1"/>
+          </a:fontRef>
+        </p:style>
+        <p:txBody>
+          <a:bodyPr rtlCol="0" anchor="t"/>
+          <a:lstStyle/>
+          <a:p>
+            <a:pPr algn="ctr"/>
+            <a:r>
+              <a:rPr lang="en-DE" sz="1000" dirty="0"/>
+              <a:t>Stack</a:t>
+            </a:r>
+          </a:p>
+        </p:txBody>
+      </p:sp>
+      <p:sp>
+        <p:nvSpPr>
+          <p:cNvPr id="3" name="Rectangle 2">
+            <a:extLst>
+              <a:ext uri="{FF2B5EF4-FFF2-40B4-BE49-F238E27FC236}">
+                <a16:creationId xmlns:a16="http://schemas.microsoft.com/office/drawing/2014/main" id="{47A5AD8D-7429-AC1C-4D2D-3ADB5BDC9AE2}"/>
+              </a:ext>
+            </a:extLst>
+          </p:cNvPr>
+          <p:cNvSpPr>
+            <a:spLocks noChangeAspect="1"/>
+          </p:cNvSpPr>
+          <p:nvPr/>
+        </p:nvSpPr>
+        <p:spPr>
+          <a:xfrm>
+            <a:off x="3446846" y="4277546"/>
+            <a:ext cx="1021279" cy="1021279"/>
+          </a:xfrm>
+          <a:prstGeom prst="rect">
+            <a:avLst/>
+          </a:prstGeom>
+          <a:blipFill dpi="0" rotWithShape="1">
+            <a:blip r:embed="rId3">
+              <a:extLst>
+                <a:ext uri="{28A0092B-C50C-407E-A947-70E740481C1C}">
+                  <a14:useLocalDpi xmlns:a14="http://schemas.microsoft.com/office/drawing/2010/main" val="0"/>
+                </a:ext>
+              </a:extLst>
+            </a:blip>
+            <a:srcRect/>
+            <a:stretch>
+              <a:fillRect/>
+            </a:stretch>
+          </a:blipFill>
+        </p:spPr>
+        <p:style>
+          <a:lnRef idx="2">
+            <a:schemeClr val="accent1">
+              <a:shade val="50000"/>
+            </a:schemeClr>
+          </a:lnRef>
+          <a:fillRef idx="1">
+            <a:schemeClr val="accent1"/>
+          </a:fillRef>
+          <a:effectRef idx="0">
+            <a:schemeClr val="accent1"/>
+          </a:effectRef>
+          <a:fontRef idx="minor">
+            <a:schemeClr val="lt1"/>
+          </a:fontRef>
+        </p:style>
+        <p:txBody>
+          <a:bodyPr rtlCol="0" anchor="t"/>
+          <a:lstStyle/>
+          <a:p>
+            <a:pPr algn="ctr"/>
+            <a:r>
+              <a:rPr lang="en-DE" sz="1000" dirty="0"/>
+              <a:t>NADH</a:t>
+            </a:r>
+          </a:p>
+        </p:txBody>
+      </p:sp>
+      <p:grpSp>
+        <p:nvGrpSpPr>
+          <p:cNvPr id="14" name="Group 13">
+            <a:extLst>
+              <a:ext uri="{FF2B5EF4-FFF2-40B4-BE49-F238E27FC236}">
+                <a16:creationId xmlns:a16="http://schemas.microsoft.com/office/drawing/2014/main" id="{3D08DCE3-D0B4-415E-7190-5C4A60F589D1}"/>
+              </a:ext>
+            </a:extLst>
+          </p:cNvPr>
+          <p:cNvGrpSpPr/>
+          <p:nvPr/>
+        </p:nvGrpSpPr>
+        <p:grpSpPr>
+          <a:xfrm>
+            <a:off x="2180386" y="1953491"/>
+            <a:ext cx="1021279" cy="1021279"/>
+            <a:chOff x="1411729" y="3666849"/>
+            <a:chExt cx="1021279" cy="1021279"/>
+          </a:xfrm>
+        </p:grpSpPr>
+        <p:pic>
+          <p:nvPicPr>
+            <p:cNvPr id="7" name="Picture 6" descr="A picture containing icon&#10;&#10;Description automatically generated">
+              <a:extLst>
+                <a:ext uri="{FF2B5EF4-FFF2-40B4-BE49-F238E27FC236}">
+                  <a16:creationId xmlns:a16="http://schemas.microsoft.com/office/drawing/2014/main" id="{38347B16-09C8-F35B-D665-DBD8AEEB5EB6}"/>
+                </a:ext>
+              </a:extLst>
+            </p:cNvPr>
+            <p:cNvPicPr>
+              <a:picLocks noChangeAspect="1"/>
+            </p:cNvPicPr>
+            <p:nvPr/>
+          </p:nvPicPr>
+          <p:blipFill>
+            <a:blip r:embed="rId4"/>
+            <a:stretch>
+              <a:fillRect/>
+            </a:stretch>
+          </p:blipFill>
+          <p:spPr>
+            <a:xfrm>
+              <a:off x="1411729" y="3666849"/>
+              <a:ext cx="1021279" cy="1021279"/>
+            </a:xfrm>
+            <a:prstGeom prst="rect">
+              <a:avLst/>
+            </a:prstGeom>
+          </p:spPr>
+        </p:pic>
+        <p:sp>
+          <p:nvSpPr>
+            <p:cNvPr id="61" name="TextBox 60">
+              <a:extLst>
+                <a:ext uri="{FF2B5EF4-FFF2-40B4-BE49-F238E27FC236}">
+                  <a16:creationId xmlns:a16="http://schemas.microsoft.com/office/drawing/2014/main" id="{E11F1B59-A6C7-CEAD-95D3-333E9F6AB345}"/>
+                </a:ext>
+              </a:extLst>
+            </p:cNvPr>
+            <p:cNvSpPr txBox="1"/>
+            <p:nvPr/>
+          </p:nvSpPr>
+          <p:spPr>
+            <a:xfrm>
+              <a:off x="1656910" y="3699177"/>
+              <a:ext cx="530915" cy="246221"/>
+            </a:xfrm>
+            <a:prstGeom prst="rect">
+              <a:avLst/>
+            </a:prstGeom>
+            <a:noFill/>
+          </p:spPr>
+          <p:txBody>
+            <a:bodyPr wrap="none" rtlCol="0">
+              <a:spAutoFit/>
+            </a:bodyPr>
+            <a:lstStyle/>
+            <a:p>
+              <a:r>
+                <a:rPr lang="en-DE" sz="1000" dirty="0">
+                  <a:solidFill>
+                    <a:schemeClr val="bg1"/>
+                  </a:solidFill>
+                </a:rPr>
+                <a:t>Napari</a:t>
+              </a:r>
+            </a:p>
+          </p:txBody>
+        </p:sp>
+      </p:grpSp>
+      <p:cxnSp>
+        <p:nvCxnSpPr>
+          <p:cNvPr id="17" name="Straight Arrow Connector 16">
+            <a:extLst>
+              <a:ext uri="{FF2B5EF4-FFF2-40B4-BE49-F238E27FC236}">
+                <a16:creationId xmlns:a16="http://schemas.microsoft.com/office/drawing/2014/main" id="{9477DD6D-2FD0-719C-49D6-2D9223FC07A9}"/>
+              </a:ext>
+            </a:extLst>
+          </p:cNvPr>
+          <p:cNvCxnSpPr>
+            <a:stCxn id="2" idx="2"/>
+            <a:endCxn id="7" idx="0"/>
+          </p:cNvCxnSpPr>
+          <p:nvPr/>
+        </p:nvCxnSpPr>
+        <p:spPr>
+          <a:xfrm flipH="1">
+            <a:off x="2691026" y="1395431"/>
+            <a:ext cx="616850" cy="558060"/>
+          </a:xfrm>
+          <a:prstGeom prst="straightConnector1">
+            <a:avLst/>
+          </a:prstGeom>
+          <a:ln>
+            <a:tailEnd type="triangle"/>
+          </a:ln>
+        </p:spPr>
+        <p:style>
+          <a:lnRef idx="1">
+            <a:schemeClr val="accent1"/>
+          </a:lnRef>
+          <a:fillRef idx="0">
+            <a:schemeClr val="accent1"/>
+          </a:fillRef>
+          <a:effectRef idx="0">
+            <a:schemeClr val="accent1"/>
+          </a:effectRef>
+          <a:fontRef idx="minor">
+            <a:schemeClr val="tx1"/>
+          </a:fontRef>
+        </p:style>
+      </p:cxnSp>
+      <p:cxnSp>
+        <p:nvCxnSpPr>
+          <p:cNvPr id="19" name="Straight Arrow Connector 18">
+            <a:extLst>
+              <a:ext uri="{FF2B5EF4-FFF2-40B4-BE49-F238E27FC236}">
+                <a16:creationId xmlns:a16="http://schemas.microsoft.com/office/drawing/2014/main" id="{83B877B3-C21D-005E-D63F-6AC2C1CC74FA}"/>
+              </a:ext>
+            </a:extLst>
+          </p:cNvPr>
+          <p:cNvCxnSpPr>
+            <a:stCxn id="2" idx="2"/>
+            <a:endCxn id="1026" idx="0"/>
+          </p:cNvCxnSpPr>
+          <p:nvPr/>
+        </p:nvCxnSpPr>
+        <p:spPr>
+          <a:xfrm>
+            <a:off x="3307876" y="1395431"/>
+            <a:ext cx="649610" cy="558059"/>
+          </a:xfrm>
+          <a:prstGeom prst="straightConnector1">
+            <a:avLst/>
+          </a:prstGeom>
+          <a:ln>
+            <a:tailEnd type="triangle"/>
+          </a:ln>
+        </p:spPr>
+        <p:style>
+          <a:lnRef idx="1">
+            <a:schemeClr val="accent1"/>
+          </a:lnRef>
+          <a:fillRef idx="0">
+            <a:schemeClr val="accent1"/>
+          </a:fillRef>
+          <a:effectRef idx="0">
+            <a:schemeClr val="accent1"/>
+          </a:effectRef>
+          <a:fontRef idx="minor">
+            <a:schemeClr val="tx1"/>
+          </a:fontRef>
+        </p:style>
+      </p:cxnSp>
+      <p:grpSp>
+        <p:nvGrpSpPr>
+          <p:cNvPr id="21" name="Group 20">
+            <a:extLst>
+              <a:ext uri="{FF2B5EF4-FFF2-40B4-BE49-F238E27FC236}">
+                <a16:creationId xmlns:a16="http://schemas.microsoft.com/office/drawing/2014/main" id="{A94BF966-1589-26D1-4374-3E8475136D9B}"/>
+              </a:ext>
+            </a:extLst>
+          </p:cNvPr>
+          <p:cNvGrpSpPr/>
+          <p:nvPr/>
+        </p:nvGrpSpPr>
+        <p:grpSpPr>
+          <a:xfrm>
+            <a:off x="3446846" y="1953490"/>
+            <a:ext cx="1021280" cy="1021280"/>
+            <a:chOff x="1569281" y="2119664"/>
+            <a:chExt cx="1021280" cy="1021280"/>
+          </a:xfrm>
+        </p:grpSpPr>
+        <p:pic>
+          <p:nvPicPr>
+            <p:cNvPr id="1026" name="Picture 2" descr="Fiji">
+              <a:extLst>
+                <a:ext uri="{FF2B5EF4-FFF2-40B4-BE49-F238E27FC236}">
+                  <a16:creationId xmlns:a16="http://schemas.microsoft.com/office/drawing/2014/main" id="{5AC1E12A-F38F-8492-50EE-D9B7634F3B82}"/>
+                </a:ext>
+              </a:extLst>
+            </p:cNvPr>
+            <p:cNvPicPr>
+              <a:picLocks noChangeAspect="1" noChangeArrowheads="1"/>
+            </p:cNvPicPr>
+            <p:nvPr/>
+          </p:nvPicPr>
+          <p:blipFill>
+            <a:blip r:embed="rId5">
+              <a:extLst>
+                <a:ext uri="{28A0092B-C50C-407E-A947-70E740481C1C}">
+                  <a14:useLocalDpi xmlns:a14="http://schemas.microsoft.com/office/drawing/2010/main" val="0"/>
+                </a:ext>
+              </a:extLst>
+            </a:blip>
+            <a:srcRect/>
+            <a:stretch>
+              <a:fillRect/>
+            </a:stretch>
+          </p:blipFill>
+          <p:spPr bwMode="auto">
+            <a:xfrm>
+              <a:off x="1569281" y="2119664"/>
+              <a:ext cx="1021280" cy="1021280"/>
+            </a:xfrm>
+            <a:prstGeom prst="rect">
+              <a:avLst/>
+            </a:prstGeom>
+            <a:noFill/>
+            <a:extLst>
+              <a:ext uri="{909E8E84-426E-40DD-AFC4-6F175D3DCCD1}">
+                <a14:hiddenFill xmlns:a14="http://schemas.microsoft.com/office/drawing/2010/main">
+                  <a:solidFill>
+                    <a:srgbClr val="FFFFFF"/>
+                  </a:solidFill>
+                </a14:hiddenFill>
+              </a:ext>
+            </a:extLst>
+          </p:spPr>
+        </p:pic>
+        <p:sp>
+          <p:nvSpPr>
+            <p:cNvPr id="20" name="TextBox 19">
+              <a:extLst>
+                <a:ext uri="{FF2B5EF4-FFF2-40B4-BE49-F238E27FC236}">
+                  <a16:creationId xmlns:a16="http://schemas.microsoft.com/office/drawing/2014/main" id="{AA0B499F-8354-FA7D-0922-E7ED1C2F513B}"/>
+                </a:ext>
+              </a:extLst>
+            </p:cNvPr>
+            <p:cNvSpPr txBox="1"/>
+            <p:nvPr/>
+          </p:nvSpPr>
+          <p:spPr>
+            <a:xfrm>
+              <a:off x="1905033" y="2151993"/>
+              <a:ext cx="349776" cy="246221"/>
+            </a:xfrm>
+            <a:prstGeom prst="rect">
+              <a:avLst/>
+            </a:prstGeom>
+            <a:noFill/>
+          </p:spPr>
+          <p:txBody>
+            <a:bodyPr wrap="none" rtlCol="0">
+              <a:spAutoFit/>
+            </a:bodyPr>
+            <a:lstStyle/>
+            <a:p>
+              <a:r>
+                <a:rPr lang="en-DE" sz="1000" dirty="0"/>
+                <a:t>FIJI</a:t>
+              </a:r>
+            </a:p>
+          </p:txBody>
+        </p:sp>
+      </p:grpSp>
+      <p:sp>
+        <p:nvSpPr>
+          <p:cNvPr id="23" name="TextBox 22">
+            <a:extLst>
+              <a:ext uri="{FF2B5EF4-FFF2-40B4-BE49-F238E27FC236}">
+                <a16:creationId xmlns:a16="http://schemas.microsoft.com/office/drawing/2014/main" id="{861D50A6-2525-BA55-E28F-F89D21332EB8}"/>
+              </a:ext>
+            </a:extLst>
+          </p:cNvPr>
+          <p:cNvSpPr txBox="1"/>
+          <p:nvPr/>
+        </p:nvSpPr>
+        <p:spPr>
+          <a:xfrm>
+            <a:off x="1047213" y="700126"/>
+            <a:ext cx="620554" cy="369332"/>
+          </a:xfrm>
+          <a:prstGeom prst="rect">
+            <a:avLst/>
+          </a:prstGeom>
+          <a:noFill/>
+        </p:spPr>
+        <p:txBody>
+          <a:bodyPr wrap="none" rtlCol="0">
+            <a:spAutoFit/>
+          </a:bodyPr>
+          <a:lstStyle/>
+          <a:p>
+            <a:r>
+              <a:rPr lang="en-DE" dirty="0"/>
+              <a:t>Data</a:t>
+            </a:r>
+          </a:p>
+        </p:txBody>
+      </p:sp>
+      <p:sp>
+        <p:nvSpPr>
+          <p:cNvPr id="24" name="TextBox 23">
+            <a:extLst>
+              <a:ext uri="{FF2B5EF4-FFF2-40B4-BE49-F238E27FC236}">
+                <a16:creationId xmlns:a16="http://schemas.microsoft.com/office/drawing/2014/main" id="{E55ED254-1B36-4BA7-D956-98785E36A274}"/>
+              </a:ext>
+            </a:extLst>
+          </p:cNvPr>
+          <p:cNvSpPr txBox="1"/>
+          <p:nvPr/>
+        </p:nvSpPr>
+        <p:spPr>
+          <a:xfrm>
+            <a:off x="425487" y="2603067"/>
+            <a:ext cx="1239314" cy="369332"/>
+          </a:xfrm>
+          <a:prstGeom prst="rect">
+            <a:avLst/>
+          </a:prstGeom>
+          <a:noFill/>
+        </p:spPr>
+        <p:txBody>
+          <a:bodyPr wrap="none" rtlCol="0">
+            <a:spAutoFit/>
+          </a:bodyPr>
+          <a:lstStyle/>
+          <a:p>
+            <a:r>
+              <a:rPr lang="en-DE" dirty="0"/>
+              <a:t>Annotation</a:t>
+            </a:r>
+          </a:p>
+        </p:txBody>
+      </p:sp>
+      <p:sp>
+        <p:nvSpPr>
+          <p:cNvPr id="25" name="Rectangle 24">
+            <a:extLst>
+              <a:ext uri="{FF2B5EF4-FFF2-40B4-BE49-F238E27FC236}">
+                <a16:creationId xmlns:a16="http://schemas.microsoft.com/office/drawing/2014/main" id="{C272EA99-76E3-5B51-1F25-750CC9A7F76C}"/>
+              </a:ext>
+            </a:extLst>
+          </p:cNvPr>
+          <p:cNvSpPr/>
+          <p:nvPr/>
+        </p:nvSpPr>
+        <p:spPr>
+          <a:xfrm>
+            <a:off x="2180387" y="3273084"/>
+            <a:ext cx="1021278" cy="259746"/>
+          </a:xfrm>
+          <a:prstGeom prst="rect">
+            <a:avLst/>
+          </a:prstGeom>
+        </p:spPr>
+        <p:style>
+          <a:lnRef idx="2">
+            <a:schemeClr val="accent1">
+              <a:shade val="50000"/>
+            </a:schemeClr>
+          </a:lnRef>
+          <a:fillRef idx="1">
+            <a:schemeClr val="accent1"/>
+          </a:fillRef>
+          <a:effectRef idx="0">
+            <a:schemeClr val="accent1"/>
+          </a:effectRef>
+          <a:fontRef idx="minor">
+            <a:schemeClr val="lt1"/>
+          </a:fontRef>
+        </p:style>
+        <p:txBody>
+          <a:bodyPr rtlCol="0" anchor="ctr"/>
+          <a:lstStyle/>
+          <a:p>
+            <a:pPr algn="ctr"/>
+            <a:r>
+              <a:rPr lang="en-DE" sz="1000" dirty="0"/>
+              <a:t>PointCloud.csv</a:t>
+            </a:r>
+          </a:p>
+        </p:txBody>
+      </p:sp>
+      <p:sp>
+        <p:nvSpPr>
+          <p:cNvPr id="26" name="Rectangle 25">
+            <a:extLst>
+              <a:ext uri="{FF2B5EF4-FFF2-40B4-BE49-F238E27FC236}">
+                <a16:creationId xmlns:a16="http://schemas.microsoft.com/office/drawing/2014/main" id="{27E6EAC3-091C-1823-DB1A-6ACC3870BBD9}"/>
+              </a:ext>
+            </a:extLst>
+          </p:cNvPr>
+          <p:cNvSpPr/>
+          <p:nvPr/>
+        </p:nvSpPr>
+        <p:spPr>
+          <a:xfrm>
+            <a:off x="3446848" y="3273084"/>
+            <a:ext cx="1021278" cy="259745"/>
+          </a:xfrm>
+          <a:prstGeom prst="rect">
+            <a:avLst/>
+          </a:prstGeom>
+        </p:spPr>
+        <p:style>
+          <a:lnRef idx="2">
+            <a:schemeClr val="accent1">
+              <a:shade val="50000"/>
+            </a:schemeClr>
+          </a:lnRef>
+          <a:fillRef idx="1">
+            <a:schemeClr val="accent1"/>
+          </a:fillRef>
+          <a:effectRef idx="0">
+            <a:schemeClr val="accent1"/>
+          </a:effectRef>
+          <a:fontRef idx="minor">
+            <a:schemeClr val="lt1"/>
+          </a:fontRef>
+        </p:style>
+        <p:txBody>
+          <a:bodyPr rtlCol="0" anchor="ctr"/>
+          <a:lstStyle/>
+          <a:p>
+            <a:pPr algn="ctr"/>
+            <a:r>
+              <a:rPr lang="en-DE" sz="1000" dirty="0"/>
+              <a:t>PointCloud.roi</a:t>
+            </a:r>
+          </a:p>
+        </p:txBody>
+      </p:sp>
+      <p:cxnSp>
+        <p:nvCxnSpPr>
+          <p:cNvPr id="29" name="Straight Arrow Connector 28">
+            <a:extLst>
+              <a:ext uri="{FF2B5EF4-FFF2-40B4-BE49-F238E27FC236}">
+                <a16:creationId xmlns:a16="http://schemas.microsoft.com/office/drawing/2014/main" id="{03A07199-C093-E711-0C48-DD533167128F}"/>
+              </a:ext>
+            </a:extLst>
+          </p:cNvPr>
+          <p:cNvCxnSpPr>
+            <a:cxnSpLocks/>
+            <a:stCxn id="7" idx="2"/>
+            <a:endCxn id="25" idx="0"/>
+          </p:cNvCxnSpPr>
+          <p:nvPr/>
+        </p:nvCxnSpPr>
+        <p:spPr>
+          <a:xfrm>
+            <a:off x="2691026" y="2974770"/>
+            <a:ext cx="0" cy="298314"/>
+          </a:xfrm>
+          <a:prstGeom prst="straightConnector1">
+            <a:avLst/>
+          </a:prstGeom>
+          <a:ln>
+            <a:tailEnd type="triangle"/>
+          </a:ln>
+        </p:spPr>
+        <p:style>
+          <a:lnRef idx="1">
+            <a:schemeClr val="accent1"/>
+          </a:lnRef>
+          <a:fillRef idx="0">
+            <a:schemeClr val="accent1"/>
+          </a:fillRef>
+          <a:effectRef idx="0">
+            <a:schemeClr val="accent1"/>
+          </a:effectRef>
+          <a:fontRef idx="minor">
+            <a:schemeClr val="tx1"/>
+          </a:fontRef>
+        </p:style>
+      </p:cxnSp>
+      <p:cxnSp>
+        <p:nvCxnSpPr>
+          <p:cNvPr id="31" name="Straight Arrow Connector 30">
+            <a:extLst>
+              <a:ext uri="{FF2B5EF4-FFF2-40B4-BE49-F238E27FC236}">
+                <a16:creationId xmlns:a16="http://schemas.microsoft.com/office/drawing/2014/main" id="{3C3969C9-7246-997A-E625-6B6DD4E86067}"/>
+              </a:ext>
+            </a:extLst>
+          </p:cNvPr>
+          <p:cNvCxnSpPr>
+            <a:cxnSpLocks/>
+            <a:stCxn id="1026" idx="2"/>
+            <a:endCxn id="26" idx="0"/>
+          </p:cNvCxnSpPr>
+          <p:nvPr/>
+        </p:nvCxnSpPr>
+        <p:spPr>
+          <a:xfrm>
+            <a:off x="3957486" y="2974770"/>
+            <a:ext cx="1" cy="298314"/>
+          </a:xfrm>
+          <a:prstGeom prst="straightConnector1">
+            <a:avLst/>
+          </a:prstGeom>
+          <a:ln>
+            <a:tailEnd type="triangle"/>
+          </a:ln>
+        </p:spPr>
+        <p:style>
+          <a:lnRef idx="1">
+            <a:schemeClr val="accent1"/>
+          </a:lnRef>
+          <a:fillRef idx="0">
+            <a:schemeClr val="accent1"/>
+          </a:fillRef>
+          <a:effectRef idx="0">
+            <a:schemeClr val="accent1"/>
+          </a:effectRef>
+          <a:fontRef idx="minor">
+            <a:schemeClr val="tx1"/>
+          </a:fontRef>
+        </p:style>
+      </p:cxnSp>
+      <p:sp>
+        <p:nvSpPr>
+          <p:cNvPr id="36" name="TextBox 35">
+            <a:extLst>
+              <a:ext uri="{FF2B5EF4-FFF2-40B4-BE49-F238E27FC236}">
+                <a16:creationId xmlns:a16="http://schemas.microsoft.com/office/drawing/2014/main" id="{C6FB0FBA-27CB-9721-DCD7-EABCC83CD244}"/>
+              </a:ext>
+            </a:extLst>
+          </p:cNvPr>
+          <p:cNvSpPr txBox="1"/>
+          <p:nvPr/>
+        </p:nvSpPr>
+        <p:spPr>
+          <a:xfrm>
+            <a:off x="272770" y="4603519"/>
+            <a:ext cx="1394997" cy="369332"/>
+          </a:xfrm>
+          <a:prstGeom prst="rect">
+            <a:avLst/>
+          </a:prstGeom>
+          <a:noFill/>
+        </p:spPr>
+        <p:txBody>
+          <a:bodyPr wrap="none" rtlCol="0">
+            <a:spAutoFit/>
+          </a:bodyPr>
+          <a:lstStyle/>
+          <a:p>
+            <a:r>
+              <a:rPr lang="en-DE" dirty="0"/>
+              <a:t>Training data</a:t>
+            </a:r>
+          </a:p>
+        </p:txBody>
+      </p:sp>
+      <p:sp>
+        <p:nvSpPr>
+          <p:cNvPr id="52" name="Rectangle 51">
+            <a:extLst>
+              <a:ext uri="{FF2B5EF4-FFF2-40B4-BE49-F238E27FC236}">
+                <a16:creationId xmlns:a16="http://schemas.microsoft.com/office/drawing/2014/main" id="{40C113AF-D003-8F94-2254-90F45B4FF3E7}"/>
+              </a:ext>
+            </a:extLst>
+          </p:cNvPr>
+          <p:cNvSpPr/>
+          <p:nvPr/>
+        </p:nvSpPr>
+        <p:spPr>
+          <a:xfrm>
+            <a:off x="2178406" y="4277547"/>
+            <a:ext cx="1021279" cy="1021279"/>
+          </a:xfrm>
+          <a:prstGeom prst="rect">
+            <a:avLst/>
+          </a:prstGeom>
+        </p:spPr>
+        <p:style>
+          <a:lnRef idx="2">
+            <a:schemeClr val="accent1">
+              <a:shade val="50000"/>
+            </a:schemeClr>
+          </a:lnRef>
+          <a:fillRef idx="1">
+            <a:schemeClr val="accent1"/>
+          </a:fillRef>
+          <a:effectRef idx="0">
+            <a:schemeClr val="accent1"/>
+          </a:effectRef>
+          <a:fontRef idx="minor">
+            <a:schemeClr val="lt1"/>
+          </a:fontRef>
+        </p:style>
+        <p:txBody>
+          <a:bodyPr rtlCol="0" anchor="ctr"/>
+          <a:lstStyle/>
+          <a:p>
+            <a:pPr algn="ctr"/>
+            <a:r>
+              <a:rPr lang="en-DE" sz="1000" dirty="0"/>
+              <a:t>PointCloud</a:t>
+            </a:r>
+          </a:p>
+        </p:txBody>
+      </p:sp>
+      <p:cxnSp>
+        <p:nvCxnSpPr>
+          <p:cNvPr id="55" name="Straight Arrow Connector 54">
+            <a:extLst>
+              <a:ext uri="{FF2B5EF4-FFF2-40B4-BE49-F238E27FC236}">
+                <a16:creationId xmlns:a16="http://schemas.microsoft.com/office/drawing/2014/main" id="{36858F9D-1DCD-A1E6-C79D-FAEF49042F64}"/>
+              </a:ext>
+            </a:extLst>
+          </p:cNvPr>
+          <p:cNvCxnSpPr>
+            <a:stCxn id="25" idx="2"/>
+            <a:endCxn id="52" idx="0"/>
+          </p:cNvCxnSpPr>
+          <p:nvPr/>
+        </p:nvCxnSpPr>
+        <p:spPr>
+          <a:xfrm flipH="1">
+            <a:off x="2689046" y="3532830"/>
+            <a:ext cx="1980" cy="744717"/>
+          </a:xfrm>
+          <a:prstGeom prst="straightConnector1">
+            <a:avLst/>
+          </a:prstGeom>
+          <a:ln>
+            <a:tailEnd type="triangle"/>
+          </a:ln>
+        </p:spPr>
+        <p:style>
+          <a:lnRef idx="1">
+            <a:schemeClr val="accent1"/>
+          </a:lnRef>
+          <a:fillRef idx="0">
+            <a:schemeClr val="accent1"/>
+          </a:fillRef>
+          <a:effectRef idx="0">
+            <a:schemeClr val="accent1"/>
+          </a:effectRef>
+          <a:fontRef idx="minor">
+            <a:schemeClr val="tx1"/>
+          </a:fontRef>
+        </p:style>
+      </p:cxnSp>
+      <p:cxnSp>
+        <p:nvCxnSpPr>
+          <p:cNvPr id="59" name="Straight Arrow Connector 58">
+            <a:extLst>
+              <a:ext uri="{FF2B5EF4-FFF2-40B4-BE49-F238E27FC236}">
+                <a16:creationId xmlns:a16="http://schemas.microsoft.com/office/drawing/2014/main" id="{E383FC03-B839-6606-3B1E-AA71EA43A992}"/>
+              </a:ext>
+            </a:extLst>
+          </p:cNvPr>
+          <p:cNvCxnSpPr>
+            <a:stCxn id="26" idx="2"/>
+            <a:endCxn id="52" idx="0"/>
+          </p:cNvCxnSpPr>
+          <p:nvPr/>
+        </p:nvCxnSpPr>
+        <p:spPr>
+          <a:xfrm flipH="1">
+            <a:off x="2689046" y="3532829"/>
+            <a:ext cx="1268441" cy="744718"/>
+          </a:xfrm>
+          <a:prstGeom prst="straightConnector1">
+            <a:avLst/>
+          </a:prstGeom>
+          <a:ln>
+            <a:tailEnd type="triangle"/>
+          </a:ln>
+        </p:spPr>
+        <p:style>
+          <a:lnRef idx="1">
+            <a:schemeClr val="accent1"/>
+          </a:lnRef>
+          <a:fillRef idx="0">
+            <a:schemeClr val="accent1"/>
+          </a:fillRef>
+          <a:effectRef idx="0">
+            <a:schemeClr val="accent1"/>
+          </a:effectRef>
+          <a:fontRef idx="minor">
+            <a:schemeClr val="tx1"/>
+          </a:fontRef>
+        </p:style>
+      </p:cxnSp>
+      <p:cxnSp>
+        <p:nvCxnSpPr>
+          <p:cNvPr id="1031" name="Elbow Connector 1030">
+            <a:extLst>
+              <a:ext uri="{FF2B5EF4-FFF2-40B4-BE49-F238E27FC236}">
+                <a16:creationId xmlns:a16="http://schemas.microsoft.com/office/drawing/2014/main" id="{72DC16F4-40CD-D6DF-AA13-6B5CD3DFBC0F}"/>
+              </a:ext>
+            </a:extLst>
+          </p:cNvPr>
+          <p:cNvCxnSpPr>
+            <a:stCxn id="2" idx="3"/>
+            <a:endCxn id="3" idx="3"/>
+          </p:cNvCxnSpPr>
+          <p:nvPr/>
+        </p:nvCxnSpPr>
+        <p:spPr>
+          <a:xfrm>
+            <a:off x="3818515" y="884792"/>
+            <a:ext cx="649610" cy="3903394"/>
+          </a:xfrm>
+          <a:prstGeom prst="bentConnector3">
+            <a:avLst>
+              <a:gd name="adj1" fmla="val 135190"/>
+            </a:avLst>
+          </a:prstGeom>
+          <a:ln>
+            <a:tailEnd type="triangle"/>
+          </a:ln>
+        </p:spPr>
+        <p:style>
+          <a:lnRef idx="1">
+            <a:schemeClr val="accent1"/>
+          </a:lnRef>
+          <a:fillRef idx="0">
+            <a:schemeClr val="accent1"/>
+          </a:fillRef>
+          <a:effectRef idx="0">
+            <a:schemeClr val="accent1"/>
+          </a:effectRef>
+          <a:fontRef idx="minor">
+            <a:schemeClr val="tx1"/>
+          </a:fontRef>
+        </p:style>
+      </p:cxnSp>
+      <p:sp>
+        <p:nvSpPr>
+          <p:cNvPr id="1032" name="Left Brace 1031">
+            <a:extLst>
+              <a:ext uri="{FF2B5EF4-FFF2-40B4-BE49-F238E27FC236}">
+                <a16:creationId xmlns:a16="http://schemas.microsoft.com/office/drawing/2014/main" id="{36AE498B-CDFE-F29D-9C66-5B66C7D9B5F3}"/>
+              </a:ext>
+            </a:extLst>
+          </p:cNvPr>
+          <p:cNvSpPr/>
+          <p:nvPr/>
+        </p:nvSpPr>
+        <p:spPr>
+          <a:xfrm>
+            <a:off x="1799112" y="374153"/>
+            <a:ext cx="184067" cy="1021278"/>
+          </a:xfrm>
+          <a:prstGeom prst="leftBrace">
+            <a:avLst/>
+          </a:prstGeom>
+        </p:spPr>
+        <p:style>
+          <a:lnRef idx="1">
+            <a:schemeClr val="accent1"/>
+          </a:lnRef>
+          <a:fillRef idx="0">
+            <a:schemeClr val="accent1"/>
+          </a:fillRef>
+          <a:effectRef idx="0">
+            <a:schemeClr val="accent1"/>
+          </a:effectRef>
+          <a:fontRef idx="minor">
+            <a:schemeClr val="tx1"/>
+          </a:fontRef>
+        </p:style>
+        <p:txBody>
+          <a:bodyPr rtlCol="0" anchor="ctr"/>
+          <a:lstStyle/>
+          <a:p>
+            <a:pPr algn="ctr"/>
+            <a:endParaRPr lang="en-DE"/>
+          </a:p>
+        </p:txBody>
+      </p:sp>
+      <p:sp>
+        <p:nvSpPr>
+          <p:cNvPr id="1033" name="Left Brace 1032">
+            <a:extLst>
+              <a:ext uri="{FF2B5EF4-FFF2-40B4-BE49-F238E27FC236}">
+                <a16:creationId xmlns:a16="http://schemas.microsoft.com/office/drawing/2014/main" id="{AF8D3A3F-AB79-5541-C34A-80A92A551BA8}"/>
+              </a:ext>
+            </a:extLst>
+          </p:cNvPr>
+          <p:cNvSpPr/>
+          <p:nvPr/>
+        </p:nvSpPr>
+        <p:spPr>
+          <a:xfrm>
+            <a:off x="1832044" y="1953492"/>
+            <a:ext cx="184067" cy="1668482"/>
+          </a:xfrm>
+          <a:prstGeom prst="leftBrace">
+            <a:avLst/>
+          </a:prstGeom>
+        </p:spPr>
+        <p:style>
+          <a:lnRef idx="1">
+            <a:schemeClr val="accent1"/>
+          </a:lnRef>
+          <a:fillRef idx="0">
+            <a:schemeClr val="accent1"/>
+          </a:fillRef>
+          <a:effectRef idx="0">
+            <a:schemeClr val="accent1"/>
+          </a:effectRef>
+          <a:fontRef idx="minor">
+            <a:schemeClr val="tx1"/>
+          </a:fontRef>
+        </p:style>
+        <p:txBody>
+          <a:bodyPr rtlCol="0" anchor="ctr"/>
+          <a:lstStyle/>
+          <a:p>
+            <a:pPr algn="ctr"/>
+            <a:endParaRPr lang="en-DE"/>
+          </a:p>
+        </p:txBody>
+      </p:sp>
+      <p:sp>
+        <p:nvSpPr>
+          <p:cNvPr id="1034" name="Left Brace 1033">
+            <a:extLst>
+              <a:ext uri="{FF2B5EF4-FFF2-40B4-BE49-F238E27FC236}">
+                <a16:creationId xmlns:a16="http://schemas.microsoft.com/office/drawing/2014/main" id="{1CBD9B7A-9C8B-924A-3B4A-642232437EE1}"/>
+              </a:ext>
+            </a:extLst>
+          </p:cNvPr>
+          <p:cNvSpPr/>
+          <p:nvPr/>
+        </p:nvSpPr>
+        <p:spPr>
+          <a:xfrm>
+            <a:off x="1839211" y="4277546"/>
+            <a:ext cx="184067" cy="1021279"/>
+          </a:xfrm>
+          <a:prstGeom prst="leftBrace">
+            <a:avLst/>
+          </a:prstGeom>
+        </p:spPr>
+        <p:style>
+          <a:lnRef idx="1">
+            <a:schemeClr val="accent1"/>
+          </a:lnRef>
+          <a:fillRef idx="0">
+            <a:schemeClr val="accent1"/>
+          </a:fillRef>
+          <a:effectRef idx="0">
+            <a:schemeClr val="accent1"/>
+          </a:effectRef>
+          <a:fontRef idx="minor">
+            <a:schemeClr val="tx1"/>
+          </a:fontRef>
+        </p:style>
+        <p:txBody>
+          <a:bodyPr rtlCol="0" anchor="ctr"/>
+          <a:lstStyle/>
+          <a:p>
+            <a:pPr algn="ctr"/>
+            <a:endParaRPr lang="en-DE"/>
+          </a:p>
+        </p:txBody>
+      </p:sp>
+      <p:grpSp>
+        <p:nvGrpSpPr>
+          <p:cNvPr id="1037" name="Group 1036">
+            <a:extLst>
+              <a:ext uri="{FF2B5EF4-FFF2-40B4-BE49-F238E27FC236}">
+                <a16:creationId xmlns:a16="http://schemas.microsoft.com/office/drawing/2014/main" id="{22CA382E-CE85-E2F5-599C-0F0614EBCA54}"/>
+              </a:ext>
+            </a:extLst>
+          </p:cNvPr>
+          <p:cNvGrpSpPr/>
+          <p:nvPr/>
+        </p:nvGrpSpPr>
+        <p:grpSpPr>
+          <a:xfrm>
+            <a:off x="2844739" y="5775276"/>
+            <a:ext cx="926274" cy="787729"/>
+            <a:chOff x="7732817" y="1253835"/>
+            <a:chExt cx="926274" cy="787729"/>
+          </a:xfrm>
+        </p:grpSpPr>
+        <p:grpSp>
+          <p:nvGrpSpPr>
+            <p:cNvPr id="1038" name="Group 1037">
+              <a:extLst>
+                <a:ext uri="{FF2B5EF4-FFF2-40B4-BE49-F238E27FC236}">
+                  <a16:creationId xmlns:a16="http://schemas.microsoft.com/office/drawing/2014/main" id="{72893746-135B-AD90-836C-7D5696444D9E}"/>
+                </a:ext>
+              </a:extLst>
+            </p:cNvPr>
+            <p:cNvGrpSpPr/>
+            <p:nvPr/>
+          </p:nvGrpSpPr>
+          <p:grpSpPr>
+            <a:xfrm>
+              <a:off x="7732817" y="1253835"/>
+              <a:ext cx="926274" cy="787729"/>
+              <a:chOff x="3986151" y="3887190"/>
+              <a:chExt cx="926274" cy="787729"/>
+            </a:xfrm>
+          </p:grpSpPr>
+          <p:sp>
+            <p:nvSpPr>
+              <p:cNvPr id="1040" name="Trapezium 1039">
+                <a:extLst>
+                  <a:ext uri="{FF2B5EF4-FFF2-40B4-BE49-F238E27FC236}">
+                    <a16:creationId xmlns:a16="http://schemas.microsoft.com/office/drawing/2014/main" id="{147F1939-4E90-02ED-048E-9230C7DB3B41}"/>
+                  </a:ext>
+                </a:extLst>
+              </p:cNvPr>
+              <p:cNvSpPr/>
+              <p:nvPr/>
+            </p:nvSpPr>
+            <p:spPr>
+              <a:xfrm rot="5400000">
+                <a:off x="3823855" y="4049486"/>
+                <a:ext cx="787729" cy="463137"/>
+              </a:xfrm>
+              <a:prstGeom prst="trapezoid">
+                <a:avLst>
+                  <a:gd name="adj" fmla="val 51923"/>
+                </a:avLst>
+              </a:prstGeom>
+            </p:spPr>
+            <p:style>
+              <a:lnRef idx="2">
+                <a:schemeClr val="accent1">
+                  <a:shade val="50000"/>
+                </a:schemeClr>
+              </a:lnRef>
+              <a:fillRef idx="1">
+                <a:schemeClr val="accent1"/>
+              </a:fillRef>
+              <a:effectRef idx="0">
+                <a:schemeClr val="accent1"/>
+              </a:effectRef>
+              <a:fontRef idx="minor">
+                <a:schemeClr val="lt1"/>
+              </a:fontRef>
+            </p:style>
+            <p:txBody>
+              <a:bodyPr rtlCol="0" anchor="ctr"/>
+              <a:lstStyle/>
+              <a:p>
+                <a:pPr algn="ctr"/>
+                <a:endParaRPr lang="en-DE" dirty="0"/>
+              </a:p>
+            </p:txBody>
+          </p:sp>
+          <p:sp>
+            <p:nvSpPr>
+              <p:cNvPr id="1041" name="Trapezium 1040">
+                <a:extLst>
+                  <a:ext uri="{FF2B5EF4-FFF2-40B4-BE49-F238E27FC236}">
+                    <a16:creationId xmlns:a16="http://schemas.microsoft.com/office/drawing/2014/main" id="{69584DA4-6C2C-8997-1248-5DBA59C0D56B}"/>
+                  </a:ext>
+                </a:extLst>
+              </p:cNvPr>
+              <p:cNvSpPr/>
+              <p:nvPr/>
+            </p:nvSpPr>
+            <p:spPr>
+              <a:xfrm rot="16200000">
+                <a:off x="4286992" y="4049486"/>
+                <a:ext cx="787729" cy="463137"/>
+              </a:xfrm>
+              <a:prstGeom prst="trapezoid">
+                <a:avLst>
+                  <a:gd name="adj" fmla="val 51923"/>
+                </a:avLst>
+              </a:prstGeom>
+            </p:spPr>
+            <p:style>
+              <a:lnRef idx="2">
+                <a:schemeClr val="accent1">
+                  <a:shade val="50000"/>
+                </a:schemeClr>
+              </a:lnRef>
+              <a:fillRef idx="1">
+                <a:schemeClr val="accent1"/>
+              </a:fillRef>
+              <a:effectRef idx="0">
+                <a:schemeClr val="accent1"/>
+              </a:effectRef>
+              <a:fontRef idx="minor">
+                <a:schemeClr val="lt1"/>
+              </a:fontRef>
+            </p:style>
+            <p:txBody>
+              <a:bodyPr rtlCol="0" anchor="ctr"/>
+              <a:lstStyle/>
+              <a:p>
+                <a:pPr algn="ctr"/>
+                <a:endParaRPr lang="en-DE"/>
+              </a:p>
+            </p:txBody>
+          </p:sp>
+        </p:grpSp>
+        <p:sp>
+          <p:nvSpPr>
+            <p:cNvPr id="1039" name="TextBox 1038">
+              <a:extLst>
+                <a:ext uri="{FF2B5EF4-FFF2-40B4-BE49-F238E27FC236}">
+                  <a16:creationId xmlns:a16="http://schemas.microsoft.com/office/drawing/2014/main" id="{0E93A461-60B4-CDDD-DDC4-5E39FA04AB15}"/>
+                </a:ext>
+              </a:extLst>
+            </p:cNvPr>
+            <p:cNvSpPr txBox="1"/>
+            <p:nvPr/>
+          </p:nvSpPr>
+          <p:spPr>
+            <a:xfrm>
+              <a:off x="7947904" y="1524588"/>
+              <a:ext cx="479618" cy="246221"/>
+            </a:xfrm>
+            <a:prstGeom prst="rect">
+              <a:avLst/>
+            </a:prstGeom>
+            <a:noFill/>
+          </p:spPr>
+          <p:txBody>
+            <a:bodyPr wrap="none" rtlCol="0">
+              <a:spAutoFit/>
+            </a:bodyPr>
+            <a:lstStyle/>
+            <a:p>
+              <a:r>
+                <a:rPr lang="en-DE" sz="1000" dirty="0">
+                  <a:solidFill>
+                    <a:schemeClr val="bg1"/>
+                  </a:solidFill>
+                </a:rPr>
+                <a:t>U-net</a:t>
+              </a:r>
+            </a:p>
+          </p:txBody>
+        </p:sp>
+      </p:grpSp>
+      <p:cxnSp>
+        <p:nvCxnSpPr>
+          <p:cNvPr id="1043" name="Elbow Connector 1042">
+            <a:extLst>
+              <a:ext uri="{FF2B5EF4-FFF2-40B4-BE49-F238E27FC236}">
+                <a16:creationId xmlns:a16="http://schemas.microsoft.com/office/drawing/2014/main" id="{D1C9EA65-C113-2000-9317-2A3E3EA4D6D6}"/>
+              </a:ext>
+            </a:extLst>
+          </p:cNvPr>
+          <p:cNvCxnSpPr>
+            <a:stCxn id="52" idx="2"/>
+            <a:endCxn id="1040" idx="1"/>
+          </p:cNvCxnSpPr>
+          <p:nvPr/>
+        </p:nvCxnSpPr>
+        <p:spPr>
+          <a:xfrm rot="16200000" flipH="1">
+            <a:off x="2584333" y="5403538"/>
+            <a:ext cx="596687" cy="387261"/>
+          </a:xfrm>
+          <a:prstGeom prst="bentConnector3">
+            <a:avLst/>
+          </a:prstGeom>
+          <a:ln>
+            <a:tailEnd type="triangle"/>
+          </a:ln>
+        </p:spPr>
+        <p:style>
+          <a:lnRef idx="1">
+            <a:schemeClr val="accent1"/>
+          </a:lnRef>
+          <a:fillRef idx="0">
+            <a:schemeClr val="accent1"/>
+          </a:fillRef>
+          <a:effectRef idx="0">
+            <a:schemeClr val="accent1"/>
+          </a:effectRef>
+          <a:fontRef idx="minor">
+            <a:schemeClr val="tx1"/>
+          </a:fontRef>
+        </p:style>
+      </p:cxnSp>
+      <p:cxnSp>
+        <p:nvCxnSpPr>
+          <p:cNvPr id="1045" name="Elbow Connector 1044">
+            <a:extLst>
+              <a:ext uri="{FF2B5EF4-FFF2-40B4-BE49-F238E27FC236}">
+                <a16:creationId xmlns:a16="http://schemas.microsoft.com/office/drawing/2014/main" id="{47E92391-4404-6A95-D4BC-BD6E796E831E}"/>
+              </a:ext>
+            </a:extLst>
+          </p:cNvPr>
+          <p:cNvCxnSpPr>
+            <a:stCxn id="3" idx="2"/>
+            <a:endCxn id="1041" idx="3"/>
+          </p:cNvCxnSpPr>
+          <p:nvPr/>
+        </p:nvCxnSpPr>
+        <p:spPr>
+          <a:xfrm rot="5400000">
+            <a:off x="3450122" y="5388149"/>
+            <a:ext cx="596688" cy="418041"/>
+          </a:xfrm>
+          <a:prstGeom prst="bentConnector3">
+            <a:avLst/>
+          </a:prstGeom>
+          <a:ln>
+            <a:tailEnd type="triangle"/>
+          </a:ln>
+        </p:spPr>
+        <p:style>
+          <a:lnRef idx="1">
+            <a:schemeClr val="accent1"/>
+          </a:lnRef>
+          <a:fillRef idx="0">
+            <a:schemeClr val="accent1"/>
+          </a:fillRef>
+          <a:effectRef idx="0">
+            <a:schemeClr val="accent1"/>
+          </a:effectRef>
+          <a:fontRef idx="minor">
+            <a:schemeClr val="tx1"/>
+          </a:fontRef>
+        </p:style>
+      </p:cxnSp>
+      <p:sp>
+        <p:nvSpPr>
+          <p:cNvPr id="1046" name="TextBox 1045">
+            <a:extLst>
+              <a:ext uri="{FF2B5EF4-FFF2-40B4-BE49-F238E27FC236}">
+                <a16:creationId xmlns:a16="http://schemas.microsoft.com/office/drawing/2014/main" id="{6A6660FC-9439-49F3-8175-954025B9C4A3}"/>
+              </a:ext>
+            </a:extLst>
+          </p:cNvPr>
+          <p:cNvSpPr txBox="1"/>
+          <p:nvPr/>
+        </p:nvSpPr>
+        <p:spPr>
+          <a:xfrm>
+            <a:off x="3169064" y="2279462"/>
+            <a:ext cx="386644" cy="369332"/>
+          </a:xfrm>
+          <a:prstGeom prst="rect">
+            <a:avLst/>
+          </a:prstGeom>
+          <a:noFill/>
+        </p:spPr>
+        <p:txBody>
+          <a:bodyPr wrap="none" rtlCol="0">
+            <a:spAutoFit/>
+          </a:bodyPr>
+          <a:lstStyle/>
+          <a:p>
+            <a:r>
+              <a:rPr lang="en-DE" dirty="0"/>
+              <a:t>or</a:t>
+            </a:r>
+          </a:p>
+        </p:txBody>
+      </p:sp>
+      <p:sp>
+        <p:nvSpPr>
+          <p:cNvPr id="5" name="Rectangle 4">
+            <a:extLst>
+              <a:ext uri="{FF2B5EF4-FFF2-40B4-BE49-F238E27FC236}">
+                <a16:creationId xmlns:a16="http://schemas.microsoft.com/office/drawing/2014/main" id="{829C8D7E-8D42-9B3B-A8B3-ABC5E815EAD3}"/>
+              </a:ext>
+            </a:extLst>
+          </p:cNvPr>
+          <p:cNvSpPr>
+            <a:spLocks noChangeAspect="1"/>
+          </p:cNvSpPr>
+          <p:nvPr/>
+        </p:nvSpPr>
+        <p:spPr>
+          <a:xfrm>
+            <a:off x="7166280" y="4277546"/>
+            <a:ext cx="1021279" cy="1021279"/>
+          </a:xfrm>
+          <a:prstGeom prst="rect">
+            <a:avLst/>
+          </a:prstGeom>
+          <a:blipFill dpi="0" rotWithShape="1">
+            <a:blip r:embed="rId3">
+              <a:extLst>
+                <a:ext uri="{28A0092B-C50C-407E-A947-70E740481C1C}">
+                  <a14:useLocalDpi xmlns:a14="http://schemas.microsoft.com/office/drawing/2010/main" val="0"/>
+                </a:ext>
+              </a:extLst>
+            </a:blip>
+            <a:srcRect/>
+            <a:stretch>
+              <a:fillRect/>
+            </a:stretch>
+          </a:blipFill>
+        </p:spPr>
+        <p:style>
+          <a:lnRef idx="2">
+            <a:schemeClr val="accent1">
+              <a:shade val="50000"/>
+            </a:schemeClr>
+          </a:lnRef>
+          <a:fillRef idx="1">
+            <a:schemeClr val="accent1"/>
+          </a:fillRef>
+          <a:effectRef idx="0">
+            <a:schemeClr val="accent1"/>
+          </a:effectRef>
+          <a:fontRef idx="minor">
+            <a:schemeClr val="lt1"/>
+          </a:fontRef>
+        </p:style>
+        <p:txBody>
+          <a:bodyPr rtlCol="0" anchor="t"/>
+          <a:lstStyle/>
+          <a:p>
+            <a:pPr algn="ctr"/>
+            <a:r>
+              <a:rPr lang="en-DE" sz="1000" dirty="0"/>
+              <a:t>NADH</a:t>
+            </a:r>
+            <a:br>
+              <a:rPr lang="ru-RU" sz="1000" dirty="0"/>
+            </a:br>
+            <a:r>
+              <a:rPr lang="en-US" sz="1000" dirty="0"/>
+              <a:t>Synthetic</a:t>
+            </a:r>
+            <a:endParaRPr lang="en-DE" sz="1000" dirty="0"/>
+          </a:p>
+        </p:txBody>
+      </p:sp>
+      <p:sp>
+        <p:nvSpPr>
+          <p:cNvPr id="28" name="Rectangle 27">
+            <a:extLst>
+              <a:ext uri="{FF2B5EF4-FFF2-40B4-BE49-F238E27FC236}">
+                <a16:creationId xmlns:a16="http://schemas.microsoft.com/office/drawing/2014/main" id="{AC201342-3209-ABB1-92EA-F5AF4960CCC4}"/>
+              </a:ext>
+            </a:extLst>
+          </p:cNvPr>
+          <p:cNvSpPr/>
+          <p:nvPr/>
+        </p:nvSpPr>
+        <p:spPr>
+          <a:xfrm>
+            <a:off x="5897840" y="4277547"/>
+            <a:ext cx="1021279" cy="1021279"/>
+          </a:xfrm>
+          <a:prstGeom prst="rect">
+            <a:avLst/>
+          </a:prstGeom>
+        </p:spPr>
+        <p:style>
+          <a:lnRef idx="2">
+            <a:schemeClr val="accent1">
+              <a:shade val="50000"/>
+            </a:schemeClr>
+          </a:lnRef>
+          <a:fillRef idx="1">
+            <a:schemeClr val="accent1"/>
+          </a:fillRef>
+          <a:effectRef idx="0">
+            <a:schemeClr val="accent1"/>
+          </a:effectRef>
+          <a:fontRef idx="minor">
+            <a:schemeClr val="lt1"/>
+          </a:fontRef>
+        </p:style>
+        <p:txBody>
+          <a:bodyPr rtlCol="0" anchor="ctr"/>
+          <a:lstStyle/>
+          <a:p>
+            <a:pPr algn="ctr"/>
+            <a:r>
+              <a:rPr lang="en-DE" sz="1000" dirty="0"/>
+              <a:t>PointCloud</a:t>
+            </a:r>
+          </a:p>
+        </p:txBody>
+      </p:sp>
+      <p:grpSp>
+        <p:nvGrpSpPr>
+          <p:cNvPr id="34" name="Group 33">
+            <a:extLst>
+              <a:ext uri="{FF2B5EF4-FFF2-40B4-BE49-F238E27FC236}">
+                <a16:creationId xmlns:a16="http://schemas.microsoft.com/office/drawing/2014/main" id="{1C5207FD-6838-AABA-794E-BF1AD08D5EB1}"/>
+              </a:ext>
+            </a:extLst>
+          </p:cNvPr>
+          <p:cNvGrpSpPr/>
+          <p:nvPr/>
+        </p:nvGrpSpPr>
+        <p:grpSpPr>
+          <a:xfrm>
+            <a:off x="6564173" y="5775276"/>
+            <a:ext cx="926274" cy="787729"/>
+            <a:chOff x="7732817" y="1253835"/>
+            <a:chExt cx="926274" cy="787729"/>
+          </a:xfrm>
+        </p:grpSpPr>
+        <p:grpSp>
+          <p:nvGrpSpPr>
+            <p:cNvPr id="35" name="Group 34">
+              <a:extLst>
+                <a:ext uri="{FF2B5EF4-FFF2-40B4-BE49-F238E27FC236}">
+                  <a16:creationId xmlns:a16="http://schemas.microsoft.com/office/drawing/2014/main" id="{E3D39EC6-9DE0-1DD5-2C7C-2C336E42074C}"/>
+                </a:ext>
+              </a:extLst>
+            </p:cNvPr>
+            <p:cNvGrpSpPr/>
+            <p:nvPr/>
+          </p:nvGrpSpPr>
+          <p:grpSpPr>
+            <a:xfrm>
+              <a:off x="7732817" y="1253835"/>
+              <a:ext cx="926274" cy="787729"/>
+              <a:chOff x="3986151" y="3887190"/>
+              <a:chExt cx="926274" cy="787729"/>
+            </a:xfrm>
+          </p:grpSpPr>
+          <p:sp>
+            <p:nvSpPr>
+              <p:cNvPr id="38" name="Trapezium 37">
+                <a:extLst>
+                  <a:ext uri="{FF2B5EF4-FFF2-40B4-BE49-F238E27FC236}">
+                    <a16:creationId xmlns:a16="http://schemas.microsoft.com/office/drawing/2014/main" id="{09A95C8B-2595-44B2-9F72-5D295AE95817}"/>
+                  </a:ext>
+                </a:extLst>
+              </p:cNvPr>
+              <p:cNvSpPr/>
+              <p:nvPr/>
+            </p:nvSpPr>
+            <p:spPr>
+              <a:xfrm rot="5400000">
+                <a:off x="3823855" y="4049486"/>
+                <a:ext cx="787729" cy="463137"/>
+              </a:xfrm>
+              <a:prstGeom prst="trapezoid">
+                <a:avLst>
+                  <a:gd name="adj" fmla="val 51923"/>
+                </a:avLst>
+              </a:prstGeom>
+            </p:spPr>
+            <p:style>
+              <a:lnRef idx="2">
+                <a:schemeClr val="accent1">
+                  <a:shade val="50000"/>
+                </a:schemeClr>
+              </a:lnRef>
+              <a:fillRef idx="1">
+                <a:schemeClr val="accent1"/>
+              </a:fillRef>
+              <a:effectRef idx="0">
+                <a:schemeClr val="accent1"/>
+              </a:effectRef>
+              <a:fontRef idx="minor">
+                <a:schemeClr val="lt1"/>
+              </a:fontRef>
+            </p:style>
+            <p:txBody>
+              <a:bodyPr rtlCol="0" anchor="ctr"/>
+              <a:lstStyle/>
+              <a:p>
+                <a:pPr algn="ctr"/>
+                <a:endParaRPr lang="en-DE" dirty="0"/>
+              </a:p>
+            </p:txBody>
+          </p:sp>
+          <p:sp>
+            <p:nvSpPr>
+              <p:cNvPr id="39" name="Trapezium 38">
+                <a:extLst>
+                  <a:ext uri="{FF2B5EF4-FFF2-40B4-BE49-F238E27FC236}">
+                    <a16:creationId xmlns:a16="http://schemas.microsoft.com/office/drawing/2014/main" id="{07683283-1ED4-4A32-916B-04FDABF044B3}"/>
+                  </a:ext>
+                </a:extLst>
+              </p:cNvPr>
+              <p:cNvSpPr/>
+              <p:nvPr/>
+            </p:nvSpPr>
+            <p:spPr>
+              <a:xfrm rot="16200000">
+                <a:off x="4286992" y="4049486"/>
+                <a:ext cx="787729" cy="463137"/>
+              </a:xfrm>
+              <a:prstGeom prst="trapezoid">
+                <a:avLst>
+                  <a:gd name="adj" fmla="val 51923"/>
+                </a:avLst>
+              </a:prstGeom>
+            </p:spPr>
+            <p:style>
+              <a:lnRef idx="2">
+                <a:schemeClr val="accent1">
+                  <a:shade val="50000"/>
+                </a:schemeClr>
+              </a:lnRef>
+              <a:fillRef idx="1">
+                <a:schemeClr val="accent1"/>
+              </a:fillRef>
+              <a:effectRef idx="0">
+                <a:schemeClr val="accent1"/>
+              </a:effectRef>
+              <a:fontRef idx="minor">
+                <a:schemeClr val="lt1"/>
+              </a:fontRef>
+            </p:style>
+            <p:txBody>
+              <a:bodyPr rtlCol="0" anchor="ctr"/>
+              <a:lstStyle/>
+              <a:p>
+                <a:pPr algn="ctr"/>
+                <a:endParaRPr lang="en-DE"/>
+              </a:p>
+            </p:txBody>
+          </p:sp>
+        </p:grpSp>
+        <p:sp>
+          <p:nvSpPr>
+            <p:cNvPr id="37" name="TextBox 36">
+              <a:extLst>
+                <a:ext uri="{FF2B5EF4-FFF2-40B4-BE49-F238E27FC236}">
+                  <a16:creationId xmlns:a16="http://schemas.microsoft.com/office/drawing/2014/main" id="{96DC33E0-FF7C-E5C5-4B36-DAD5C737A6EE}"/>
+                </a:ext>
+              </a:extLst>
+            </p:cNvPr>
+            <p:cNvSpPr txBox="1"/>
+            <p:nvPr/>
+          </p:nvSpPr>
+          <p:spPr>
+            <a:xfrm>
+              <a:off x="7947904" y="1524588"/>
+              <a:ext cx="479618" cy="246221"/>
+            </a:xfrm>
+            <a:prstGeom prst="rect">
+              <a:avLst/>
+            </a:prstGeom>
+            <a:noFill/>
+          </p:spPr>
+          <p:txBody>
+            <a:bodyPr wrap="none" rtlCol="0">
+              <a:spAutoFit/>
+            </a:bodyPr>
+            <a:lstStyle/>
+            <a:p>
+              <a:r>
+                <a:rPr lang="en-DE" sz="1000" dirty="0">
+                  <a:solidFill>
+                    <a:schemeClr val="bg1"/>
+                  </a:solidFill>
+                </a:rPr>
+                <a:t>U-net</a:t>
+              </a:r>
+            </a:p>
+          </p:txBody>
+        </p:sp>
+      </p:grpSp>
+      <p:cxnSp>
+        <p:nvCxnSpPr>
+          <p:cNvPr id="40" name="Elbow Connector 39">
+            <a:extLst>
+              <a:ext uri="{FF2B5EF4-FFF2-40B4-BE49-F238E27FC236}">
+                <a16:creationId xmlns:a16="http://schemas.microsoft.com/office/drawing/2014/main" id="{71400A55-6439-2B03-B9D3-E50562C52136}"/>
+              </a:ext>
+            </a:extLst>
+          </p:cNvPr>
+          <p:cNvCxnSpPr>
+            <a:stCxn id="28" idx="2"/>
+            <a:endCxn id="38" idx="1"/>
+          </p:cNvCxnSpPr>
+          <p:nvPr/>
+        </p:nvCxnSpPr>
+        <p:spPr>
+          <a:xfrm rot="16200000" flipH="1">
+            <a:off x="6303767" y="5403538"/>
+            <a:ext cx="596687" cy="387261"/>
+          </a:xfrm>
+          <a:prstGeom prst="bentConnector3">
+            <a:avLst/>
+          </a:prstGeom>
+          <a:ln>
+            <a:tailEnd type="triangle"/>
+          </a:ln>
+        </p:spPr>
+        <p:style>
+          <a:lnRef idx="1">
+            <a:schemeClr val="accent1"/>
+          </a:lnRef>
+          <a:fillRef idx="0">
+            <a:schemeClr val="accent1"/>
+          </a:fillRef>
+          <a:effectRef idx="0">
+            <a:schemeClr val="accent1"/>
+          </a:effectRef>
+          <a:fontRef idx="minor">
+            <a:schemeClr val="tx1"/>
+          </a:fontRef>
+        </p:style>
+      </p:cxnSp>
+      <p:cxnSp>
+        <p:nvCxnSpPr>
+          <p:cNvPr id="41" name="Elbow Connector 40">
+            <a:extLst>
+              <a:ext uri="{FF2B5EF4-FFF2-40B4-BE49-F238E27FC236}">
+                <a16:creationId xmlns:a16="http://schemas.microsoft.com/office/drawing/2014/main" id="{764DABCF-0F4C-7518-C657-9681515FE83F}"/>
+              </a:ext>
+            </a:extLst>
+          </p:cNvPr>
+          <p:cNvCxnSpPr>
+            <a:stCxn id="5" idx="2"/>
+            <a:endCxn id="39" idx="3"/>
+          </p:cNvCxnSpPr>
+          <p:nvPr/>
+        </p:nvCxnSpPr>
+        <p:spPr>
+          <a:xfrm rot="5400000">
+            <a:off x="7169556" y="5388149"/>
+            <a:ext cx="596688" cy="418041"/>
+          </a:xfrm>
+          <a:prstGeom prst="bentConnector3">
+            <a:avLst/>
+          </a:prstGeom>
+          <a:ln>
+            <a:tailEnd type="triangle"/>
+          </a:ln>
+        </p:spPr>
+        <p:style>
+          <a:lnRef idx="1">
+            <a:schemeClr val="accent1"/>
+          </a:lnRef>
+          <a:fillRef idx="0">
+            <a:schemeClr val="accent1"/>
+          </a:fillRef>
+          <a:effectRef idx="0">
+            <a:schemeClr val="accent1"/>
+          </a:effectRef>
+          <a:fontRef idx="minor">
+            <a:schemeClr val="tx1"/>
+          </a:fontRef>
+        </p:style>
+      </p:cxnSp>
+      <p:sp>
+        <p:nvSpPr>
+          <p:cNvPr id="43" name="Rectangle 42">
+            <a:extLst>
+              <a:ext uri="{FF2B5EF4-FFF2-40B4-BE49-F238E27FC236}">
+                <a16:creationId xmlns:a16="http://schemas.microsoft.com/office/drawing/2014/main" id="{E360132D-243A-0591-F2D9-D4FA336DE37D}"/>
+              </a:ext>
+            </a:extLst>
+          </p:cNvPr>
+          <p:cNvSpPr>
+            <a:spLocks noChangeAspect="1"/>
+          </p:cNvSpPr>
+          <p:nvPr/>
+        </p:nvSpPr>
+        <p:spPr>
+          <a:xfrm>
+            <a:off x="6516670" y="382063"/>
+            <a:ext cx="1021278" cy="1021278"/>
+          </a:xfrm>
+          <a:prstGeom prst="rect">
+            <a:avLst/>
+          </a:prstGeom>
+          <a:blipFill dpi="0" rotWithShape="1">
+            <a:blip r:embed="rId6">
+              <a:extLst>
+                <a:ext uri="{28A0092B-C50C-407E-A947-70E740481C1C}">
+                  <a14:useLocalDpi xmlns:a14="http://schemas.microsoft.com/office/drawing/2010/main" val="0"/>
+                </a:ext>
+              </a:extLst>
+            </a:blip>
+            <a:srcRect/>
+            <a:stretch>
+              <a:fillRect/>
+            </a:stretch>
+          </a:blipFill>
+        </p:spPr>
+        <p:style>
+          <a:lnRef idx="2">
+            <a:schemeClr val="accent1">
+              <a:shade val="50000"/>
+            </a:schemeClr>
+          </a:lnRef>
+          <a:fillRef idx="1">
+            <a:schemeClr val="accent1"/>
+          </a:fillRef>
+          <a:effectRef idx="0">
+            <a:schemeClr val="accent1"/>
+          </a:effectRef>
+          <a:fontRef idx="minor">
+            <a:schemeClr val="lt1"/>
+          </a:fontRef>
+        </p:style>
+        <p:txBody>
+          <a:bodyPr rtlCol="0" anchor="t"/>
+          <a:lstStyle/>
+          <a:p>
+            <a:pPr algn="ctr"/>
+            <a:r>
+              <a:rPr lang="en-DE" sz="1000" dirty="0"/>
+              <a:t>Simulator</a:t>
+            </a:r>
+          </a:p>
+        </p:txBody>
+      </p:sp>
+      <p:cxnSp>
+        <p:nvCxnSpPr>
+          <p:cNvPr id="46" name="Straight Arrow Connector 45">
+            <a:extLst>
+              <a:ext uri="{FF2B5EF4-FFF2-40B4-BE49-F238E27FC236}">
+                <a16:creationId xmlns:a16="http://schemas.microsoft.com/office/drawing/2014/main" id="{3BFC73B5-72A6-39E7-A39C-81651E4D07CB}"/>
+              </a:ext>
+            </a:extLst>
+          </p:cNvPr>
+          <p:cNvCxnSpPr>
+            <a:stCxn id="43" idx="2"/>
+            <a:endCxn id="5" idx="0"/>
+          </p:cNvCxnSpPr>
+          <p:nvPr/>
+        </p:nvCxnSpPr>
+        <p:spPr>
+          <a:xfrm>
+            <a:off x="7027309" y="1403341"/>
+            <a:ext cx="649611" cy="2874205"/>
+          </a:xfrm>
+          <a:prstGeom prst="straightConnector1">
+            <a:avLst/>
+          </a:prstGeom>
+          <a:ln>
+            <a:tailEnd type="triangle"/>
+          </a:ln>
+        </p:spPr>
+        <p:style>
+          <a:lnRef idx="1">
+            <a:schemeClr val="accent1"/>
+          </a:lnRef>
+          <a:fillRef idx="0">
+            <a:schemeClr val="accent1"/>
+          </a:fillRef>
+          <a:effectRef idx="0">
+            <a:schemeClr val="accent1"/>
+          </a:effectRef>
+          <a:fontRef idx="minor">
+            <a:schemeClr val="tx1"/>
+          </a:fontRef>
+        </p:style>
+      </p:cxnSp>
+      <p:cxnSp>
+        <p:nvCxnSpPr>
+          <p:cNvPr id="48" name="Straight Arrow Connector 47">
+            <a:extLst>
+              <a:ext uri="{FF2B5EF4-FFF2-40B4-BE49-F238E27FC236}">
+                <a16:creationId xmlns:a16="http://schemas.microsoft.com/office/drawing/2014/main" id="{7CDA11D5-0E07-1E6A-B3B2-2A62ECF95D33}"/>
+              </a:ext>
+            </a:extLst>
+          </p:cNvPr>
+          <p:cNvCxnSpPr>
+            <a:stCxn id="43" idx="2"/>
+            <a:endCxn id="28" idx="0"/>
+          </p:cNvCxnSpPr>
+          <p:nvPr/>
+        </p:nvCxnSpPr>
+        <p:spPr>
+          <a:xfrm flipH="1">
+            <a:off x="6408480" y="1403341"/>
+            <a:ext cx="618829" cy="2874206"/>
+          </a:xfrm>
+          <a:prstGeom prst="straightConnector1">
+            <a:avLst/>
+          </a:prstGeom>
+          <a:ln>
+            <a:tailEnd type="triangle"/>
+          </a:ln>
+        </p:spPr>
+        <p:style>
+          <a:lnRef idx="1">
+            <a:schemeClr val="accent1"/>
+          </a:lnRef>
+          <a:fillRef idx="0">
+            <a:schemeClr val="accent1"/>
+          </a:fillRef>
+          <a:effectRef idx="0">
+            <a:schemeClr val="accent1"/>
+          </a:effectRef>
+          <a:fontRef idx="minor">
+            <a:schemeClr val="tx1"/>
+          </a:fontRef>
+        </p:style>
+      </p:cxnSp>
+    </p:spTree>
+    <p:extLst>
+      <p:ext uri="{BB962C8B-B14F-4D97-AF65-F5344CB8AC3E}">
+        <p14:creationId xmlns:p14="http://schemas.microsoft.com/office/powerpoint/2010/main" val="626661408"/>
+      </p:ext>
+    </p:extLst>
+  </p:cSld>
+  <p:clrMapOvr>
+    <a:masterClrMapping/>
+  </p:clrMapOvr>
+</p:sld>
+</file>
+
+<file path=ppt/slides/slide4.xml><?xml version="1.0" encoding="utf-8"?>
+<p:sld xmlns:a="http://schemas.openxmlformats.org/drawingml/2006/main" xmlns:r="http://schemas.openxmlformats.org/officeDocument/2006/relationships" xmlns:p="http://schemas.openxmlformats.org/presentationml/2006/main">
+  <p:cSld>
+    <p:spTree>
+      <p:nvGrpSpPr>
+        <p:cNvPr id="1" name=""/>
+        <p:cNvGrpSpPr/>
+        <p:nvPr/>
+      </p:nvGrpSpPr>
+      <p:grpSpPr>
+        <a:xfrm>
+          <a:off x="0" y="0"/>
+          <a:ext cx="0" cy="0"/>
+          <a:chOff x="0" y="0"/>
+          <a:chExt cx="0" cy="0"/>
+        </a:xfrm>
+      </p:grpSpPr>
+      <p:sp>
+        <p:nvSpPr>
+          <p:cNvPr id="4" name="TextBox 3">
+            <a:extLst>
+              <a:ext uri="{FF2B5EF4-FFF2-40B4-BE49-F238E27FC236}">
+                <a16:creationId xmlns:a16="http://schemas.microsoft.com/office/drawing/2014/main" id="{FC5427E0-7C3E-9DE7-4596-CAB01C18D4B2}"/>
+              </a:ext>
+            </a:extLst>
+          </p:cNvPr>
+          <p:cNvSpPr txBox="1"/>
+          <p:nvPr/>
+        </p:nvSpPr>
+        <p:spPr>
+          <a:xfrm>
+            <a:off x="0" y="215153"/>
+            <a:ext cx="4371005" cy="369332"/>
+          </a:xfrm>
+          <a:prstGeom prst="rect">
+            <a:avLst/>
+          </a:prstGeom>
+          <a:noFill/>
+        </p:spPr>
+        <p:txBody>
+          <a:bodyPr wrap="none" rtlCol="0">
+            <a:spAutoFit/>
+          </a:bodyPr>
+          <a:lstStyle/>
+          <a:p>
+            <a:r>
+              <a:rPr lang="en-DE" dirty="0"/>
+              <a:t>Shape generation with differrent parameters</a:t>
+            </a:r>
+          </a:p>
+        </p:txBody>
+      </p:sp>
+      <p:pic>
+        <p:nvPicPr>
+          <p:cNvPr id="8" name="Picture 7">
+            <a:extLst>
+              <a:ext uri="{FF2B5EF4-FFF2-40B4-BE49-F238E27FC236}">
+                <a16:creationId xmlns:a16="http://schemas.microsoft.com/office/drawing/2014/main" id="{C8B716F2-F3B3-8AC1-BEB5-AE277CCD9854}"/>
+              </a:ext>
+            </a:extLst>
+          </p:cNvPr>
+          <p:cNvPicPr>
+            <a:picLocks noChangeAspect="1"/>
+          </p:cNvPicPr>
+          <p:nvPr/>
+        </p:nvPicPr>
+        <p:blipFill>
+          <a:blip r:embed="rId2"/>
+          <a:stretch>
+            <a:fillRect/>
+          </a:stretch>
+        </p:blipFill>
+        <p:spPr>
+          <a:xfrm>
+            <a:off x="2667000" y="0"/>
+            <a:ext cx="6858000" cy="6858000"/>
+          </a:xfrm>
+          <a:prstGeom prst="rect">
+            <a:avLst/>
+          </a:prstGeom>
+        </p:spPr>
+      </p:pic>
+    </p:spTree>
+    <p:extLst>
+      <p:ext uri="{BB962C8B-B14F-4D97-AF65-F5344CB8AC3E}">
+        <p14:creationId xmlns:p14="http://schemas.microsoft.com/office/powerpoint/2010/main" val="3031283326"/>
+      </p:ext>
+    </p:extLst>
+  </p:cSld>
+  <p:clrMapOvr>
+    <a:masterClrMapping/>
+  </p:clrMapOvr>
+</p:sld>
+</file>
+
 <file path=ppt/theme/theme1.xml><?xml version="1.0" encoding="utf-8"?>
 <a:theme xmlns:a="http://schemas.openxmlformats.org/drawingml/2006/main" name="Office Theme">
   <a:themeElements>

</xml_diff>